<commit_message>
updated Lec 08, Project Rubric
</commit_message>
<xml_diff>
--- a/Syllabus/ProjectFiles/ProjectGradingRubric.pptx
+++ b/Syllabus/ProjectFiles/ProjectGradingRubric.pptx
@@ -11,9 +11,9 @@
     <p:sldId id="256" r:id="rId2"/>
     <p:sldId id="257" r:id="rId3"/>
     <p:sldId id="258" r:id="rId4"/>
-    <p:sldId id="261" r:id="rId5"/>
-    <p:sldId id="262" r:id="rId6"/>
-    <p:sldId id="259" r:id="rId7"/>
+    <p:sldId id="263" r:id="rId5"/>
+    <p:sldId id="261" r:id="rId6"/>
+    <p:sldId id="262" r:id="rId7"/>
   </p:sldIdLst>
   <p:sldSz cx="9144000" cy="5143500" type="screen16x9"/>
   <p:notesSz cx="6858000" cy="9144000"/>
@@ -744,8 +744,8 @@
         </p:nvSpPr>
         <p:spPr>
           <a:xfrm>
-            <a:off x="381300" y="685800"/>
-            <a:ext cx="6096075" cy="3429000"/>
+            <a:off x="381000" y="685800"/>
+            <a:ext cx="6096000" cy="3429000"/>
           </a:xfrm>
           <a:custGeom>
             <a:avLst/>
@@ -1032,6 +1032,115 @@
   <p:cSld>
     <p:spTree>
       <p:nvGrpSpPr>
+        <p:cNvPr id="1" name="Shape 61"/>
+        <p:cNvGrpSpPr/>
+        <p:nvPr/>
+      </p:nvGrpSpPr>
+      <p:grpSpPr>
+        <a:xfrm>
+          <a:off x="0" y="0"/>
+          <a:ext cx="0" cy="0"/>
+          <a:chOff x="0" y="0"/>
+          <a:chExt cx="0" cy="0"/>
+        </a:xfrm>
+      </p:grpSpPr>
+      <p:sp>
+        <p:nvSpPr>
+          <p:cNvPr id="62" name="Google Shape;62;gf96d0052d1_0_10:notes"/>
+          <p:cNvSpPr>
+            <a:spLocks noGrp="1" noRot="1" noChangeAspect="1"/>
+          </p:cNvSpPr>
+          <p:nvPr>
+            <p:ph type="sldImg" idx="2"/>
+          </p:nvPr>
+        </p:nvSpPr>
+        <p:spPr>
+          <a:xfrm>
+            <a:off x="381000" y="685800"/>
+            <a:ext cx="6096000" cy="3429000"/>
+          </a:xfrm>
+          <a:custGeom>
+            <a:avLst/>
+            <a:gdLst/>
+            <a:ahLst/>
+            <a:cxnLst/>
+            <a:rect l="l" t="t" r="r" b="b"/>
+            <a:pathLst>
+              <a:path w="120000" h="120000" extrusionOk="0">
+                <a:moveTo>
+                  <a:pt x="0" y="0"/>
+                </a:moveTo>
+                <a:lnTo>
+                  <a:pt x="120000" y="0"/>
+                </a:lnTo>
+                <a:lnTo>
+                  <a:pt x="120000" y="120000"/>
+                </a:lnTo>
+                <a:lnTo>
+                  <a:pt x="0" y="120000"/>
+                </a:lnTo>
+                <a:close/>
+              </a:path>
+            </a:pathLst>
+          </a:custGeom>
+        </p:spPr>
+      </p:sp>
+      <p:sp>
+        <p:nvSpPr>
+          <p:cNvPr id="63" name="Google Shape;63;gf96d0052d1_0_10:notes"/>
+          <p:cNvSpPr txBox="1">
+            <a:spLocks noGrp="1"/>
+          </p:cNvSpPr>
+          <p:nvPr>
+            <p:ph type="body" idx="1"/>
+          </p:nvPr>
+        </p:nvSpPr>
+        <p:spPr>
+          <a:xfrm>
+            <a:off x="685800" y="4343400"/>
+            <a:ext cx="5486400" cy="4114800"/>
+          </a:xfrm>
+          <a:prstGeom prst="rect">
+            <a:avLst/>
+          </a:prstGeom>
+        </p:spPr>
+        <p:txBody>
+          <a:bodyPr spcFirstLastPara="1" wrap="square" lIns="91425" tIns="91425" rIns="91425" bIns="91425" anchor="t" anchorCtr="0">
+            <a:noAutofit/>
+          </a:bodyPr>
+          <a:lstStyle/>
+          <a:p>
+            <a:pPr marL="0" lvl="0" indent="0" algn="l" rtl="0">
+              <a:spcBef>
+                <a:spcPts val="0"/>
+              </a:spcBef>
+              <a:spcAft>
+                <a:spcPts val="0"/>
+              </a:spcAft>
+              <a:buNone/>
+            </a:pPr>
+            <a:endParaRPr/>
+          </a:p>
+        </p:txBody>
+      </p:sp>
+    </p:spTree>
+    <p:extLst>
+      <p:ext uri="{BB962C8B-B14F-4D97-AF65-F5344CB8AC3E}">
+        <p14:creationId xmlns:p14="http://schemas.microsoft.com/office/powerpoint/2010/main" val="1070378466"/>
+      </p:ext>
+    </p:extLst>
+  </p:cSld>
+  <p:clrMapOvr>
+    <a:masterClrMapping/>
+  </p:clrMapOvr>
+</p:notes>
+</file>
+
+<file path=ppt/notesSlides/notesSlide5.xml><?xml version="1.0" encoding="utf-8"?>
+<p:notes xmlns:a="http://schemas.openxmlformats.org/drawingml/2006/main" xmlns:r="http://schemas.openxmlformats.org/officeDocument/2006/relationships" xmlns:p="http://schemas.openxmlformats.org/presentationml/2006/main" showMasterSp="0" showMasterPhAnim="0">
+  <p:cSld>
+    <p:spTree>
+      <p:nvGrpSpPr>
         <p:cNvPr id="1" name="Shape 79"/>
         <p:cNvGrpSpPr/>
         <p:nvPr/>
@@ -1131,7 +1240,7 @@
 </p:notes>
 </file>
 
-<file path=ppt/notesSlides/notesSlide5.xml><?xml version="1.0" encoding="utf-8"?>
+<file path=ppt/notesSlides/notesSlide6.xml><?xml version="1.0" encoding="utf-8"?>
 <p:notes xmlns:a="http://schemas.openxmlformats.org/drawingml/2006/main" xmlns:r="http://schemas.openxmlformats.org/officeDocument/2006/relationships" xmlns:p="http://schemas.openxmlformats.org/presentationml/2006/main" showMasterSp="0" showMasterPhAnim="0">
   <p:cSld>
     <p:spTree>
@@ -1192,110 +1301,6 @@
       <p:sp>
         <p:nvSpPr>
           <p:cNvPr id="87" name="Google Shape;87;gf96d0052d1_0_26:notes"/>
-          <p:cNvSpPr txBox="1">
-            <a:spLocks noGrp="1"/>
-          </p:cNvSpPr>
-          <p:nvPr>
-            <p:ph type="body" idx="1"/>
-          </p:nvPr>
-        </p:nvSpPr>
-        <p:spPr>
-          <a:xfrm>
-            <a:off x="685800" y="4343400"/>
-            <a:ext cx="5486400" cy="4114800"/>
-          </a:xfrm>
-          <a:prstGeom prst="rect">
-            <a:avLst/>
-          </a:prstGeom>
-        </p:spPr>
-        <p:txBody>
-          <a:bodyPr spcFirstLastPara="1" wrap="square" lIns="91425" tIns="91425" rIns="91425" bIns="91425" anchor="t" anchorCtr="0">
-            <a:noAutofit/>
-          </a:bodyPr>
-          <a:lstStyle/>
-          <a:p>
-            <a:pPr marL="0" lvl="0" indent="0" algn="l" rtl="0">
-              <a:spcBef>
-                <a:spcPts val="0"/>
-              </a:spcBef>
-              <a:spcAft>
-                <a:spcPts val="0"/>
-              </a:spcAft>
-              <a:buNone/>
-            </a:pPr>
-            <a:endParaRPr/>
-          </a:p>
-        </p:txBody>
-      </p:sp>
-    </p:spTree>
-  </p:cSld>
-  <p:clrMapOvr>
-    <a:masterClrMapping/>
-  </p:clrMapOvr>
-</p:notes>
-</file>
-
-<file path=ppt/notesSlides/notesSlide6.xml><?xml version="1.0" encoding="utf-8"?>
-<p:notes xmlns:a="http://schemas.openxmlformats.org/drawingml/2006/main" xmlns:r="http://schemas.openxmlformats.org/officeDocument/2006/relationships" xmlns:p="http://schemas.openxmlformats.org/presentationml/2006/main" showMasterSp="0" showMasterPhAnim="0">
-  <p:cSld>
-    <p:spTree>
-      <p:nvGrpSpPr>
-        <p:cNvPr id="1" name="Shape 67"/>
-        <p:cNvGrpSpPr/>
-        <p:nvPr/>
-      </p:nvGrpSpPr>
-      <p:grpSpPr>
-        <a:xfrm>
-          <a:off x="0" y="0"/>
-          <a:ext cx="0" cy="0"/>
-          <a:chOff x="0" y="0"/>
-          <a:chExt cx="0" cy="0"/>
-        </a:xfrm>
-      </p:grpSpPr>
-      <p:sp>
-        <p:nvSpPr>
-          <p:cNvPr id="68" name="Google Shape;68;gf96d0052d1_0_15:notes"/>
-          <p:cNvSpPr>
-            <a:spLocks noGrp="1" noRot="1" noChangeAspect="1"/>
-          </p:cNvSpPr>
-          <p:nvPr>
-            <p:ph type="sldImg" idx="2"/>
-          </p:nvPr>
-        </p:nvSpPr>
-        <p:spPr>
-          <a:xfrm>
-            <a:off x="381000" y="685800"/>
-            <a:ext cx="6096000" cy="3429000"/>
-          </a:xfrm>
-          <a:custGeom>
-            <a:avLst/>
-            <a:gdLst/>
-            <a:ahLst/>
-            <a:cxnLst/>
-            <a:rect l="l" t="t" r="r" b="b"/>
-            <a:pathLst>
-              <a:path w="120000" h="120000" extrusionOk="0">
-                <a:moveTo>
-                  <a:pt x="0" y="0"/>
-                </a:moveTo>
-                <a:lnTo>
-                  <a:pt x="120000" y="0"/>
-                </a:lnTo>
-                <a:lnTo>
-                  <a:pt x="120000" y="120000"/>
-                </a:lnTo>
-                <a:lnTo>
-                  <a:pt x="0" y="120000"/>
-                </a:lnTo>
-                <a:close/>
-              </a:path>
-            </a:pathLst>
-          </a:custGeom>
-        </p:spPr>
-      </p:sp>
-      <p:sp>
-        <p:nvSpPr>
-          <p:cNvPr id="69" name="Google Shape;69;gf96d0052d1_0_15:notes"/>
           <p:cNvSpPr txBox="1">
             <a:spLocks noGrp="1"/>
           </p:cNvSpPr>
@@ -6182,10 +6187,10 @@
               <a:buNone/>
             </a:pPr>
             <a:r>
-              <a:rPr lang="en"/>
+              <a:rPr lang="en" dirty="0"/>
               <a:t>DSCI 633</a:t>
             </a:r>
-            <a:endParaRPr/>
+            <a:endParaRPr dirty="0"/>
           </a:p>
           <a:p>
             <a:pPr marL="0" lvl="0" indent="0" algn="ctr" rtl="0">
@@ -6198,10 +6203,10 @@
               <a:buNone/>
             </a:pPr>
             <a:r>
-              <a:rPr lang="en"/>
-              <a:t>Intro to Data Science and Analytics</a:t>
+              <a:rPr lang="en" dirty="0"/>
+              <a:t>Foundations of Data Science and Analytics</a:t>
             </a:r>
-            <a:endParaRPr/>
+            <a:endParaRPr dirty="0"/>
           </a:p>
           <a:p>
             <a:pPr marL="0" lvl="0" indent="0" algn="ctr" rtl="0">
@@ -6213,7 +6218,7 @@
               </a:spcAft>
               <a:buNone/>
             </a:pPr>
-            <a:endParaRPr/>
+            <a:endParaRPr dirty="0"/>
           </a:p>
           <a:p>
             <a:pPr marL="0" lvl="0" indent="0" algn="ctr" rtl="0">
@@ -6226,10 +6231,10 @@
               <a:buNone/>
             </a:pPr>
             <a:r>
-              <a:rPr lang="en"/>
+              <a:rPr lang="en" dirty="0"/>
               <a:t>Nidhi Rastogi</a:t>
             </a:r>
-            <a:endParaRPr/>
+            <a:endParaRPr dirty="0"/>
           </a:p>
           <a:p>
             <a:pPr marL="0" lvl="0" indent="0" algn="ctr" rtl="0">
@@ -6242,10 +6247,10 @@
               <a:buNone/>
             </a:pPr>
             <a:r>
-              <a:rPr lang="en"/>
+              <a:rPr lang="en" dirty="0"/>
               <a:t>Assistant Professor, RIT</a:t>
             </a:r>
-            <a:endParaRPr/>
+            <a:endParaRPr dirty="0"/>
           </a:p>
         </p:txBody>
       </p:sp>
@@ -6314,7 +6319,7 @@
                   <a:schemeClr val="dk1"/>
                 </a:solidFill>
               </a:rPr>
-              <a:t>Points Breakdown (35 points total) - 20% of your grade</a:t>
+              <a:t>Project Points Breakdown (60 points total) - 30% of your grade</a:t>
             </a:r>
             <a:endParaRPr b="1" dirty="0">
               <a:solidFill>
@@ -6337,13 +6342,52 @@
               <a:buAutoNum type="arabicPeriod"/>
             </a:pPr>
             <a:r>
+              <a:rPr lang="en" b="1" dirty="0">
+                <a:solidFill>
+                  <a:schemeClr val="dk1"/>
+                </a:solidFill>
+              </a:rPr>
+              <a:t>Code</a:t>
+            </a:r>
+            <a:r>
               <a:rPr lang="en" dirty="0">
                 <a:solidFill>
                   <a:schemeClr val="dk1"/>
                 </a:solidFill>
               </a:rPr>
-              <a:t>Main code submission specifications and score breakdown - 20 points</a:t>
+              <a:t> - 30 points</a:t>
             </a:r>
+          </a:p>
+          <a:p>
+            <a:pPr marL="857250" lvl="1" indent="-285750">
+              <a:spcBef>
+                <a:spcPts val="1200"/>
+              </a:spcBef>
+              <a:buClr>
+                <a:schemeClr val="dk1"/>
+              </a:buClr>
+              <a:buSzPts val="1800"/>
+            </a:pPr>
+            <a:r>
+              <a:rPr lang="en" dirty="0">
+                <a:solidFill>
+                  <a:schemeClr val="dk1"/>
+                </a:solidFill>
+              </a:rPr>
+              <a:t>Code does not run = Automatically 0 points awarded.</a:t>
+            </a:r>
+          </a:p>
+          <a:p>
+            <a:pPr marL="571500" lvl="1" indent="0">
+              <a:spcBef>
+                <a:spcPts val="1200"/>
+              </a:spcBef>
+              <a:buClr>
+                <a:schemeClr val="dk1"/>
+              </a:buClr>
+              <a:buSzPts val="1800"/>
+              <a:buNone/>
+            </a:pPr>
             <a:endParaRPr dirty="0">
               <a:solidFill>
                 <a:schemeClr val="dk1"/>
@@ -6365,14 +6409,37 @@
               <a:buAutoNum type="arabicPeriod"/>
             </a:pPr>
             <a:r>
+              <a:rPr lang="en" b="1" dirty="0">
+                <a:solidFill>
+                  <a:schemeClr val="dk1"/>
+                </a:solidFill>
+              </a:rPr>
+              <a:t>Report</a:t>
+            </a:r>
+            <a:r>
               <a:rPr lang="en" dirty="0">
                 <a:solidFill>
                   <a:schemeClr val="dk1"/>
                 </a:solidFill>
               </a:rPr>
-              <a:t>Project Report - (5 teams with 4-5 members) 7 points</a:t>
+              <a:t> - 10 points</a:t>
             </a:r>
-            <a:endParaRPr dirty="0">
+          </a:p>
+          <a:p>
+            <a:pPr marL="457200" lvl="0" indent="-342900" algn="l" rtl="0">
+              <a:spcBef>
+                <a:spcPts val="0"/>
+              </a:spcBef>
+              <a:spcAft>
+                <a:spcPts val="0"/>
+              </a:spcAft>
+              <a:buClr>
+                <a:schemeClr val="dk1"/>
+              </a:buClr>
+              <a:buSzPts val="1800"/>
+              <a:buAutoNum type="arabicPeriod"/>
+            </a:pPr>
+            <a:endParaRPr lang="en" dirty="0">
               <a:solidFill>
                 <a:schemeClr val="dk1"/>
               </a:solidFill>
@@ -6393,12 +6460,125 @@
               <a:buAutoNum type="arabicPeriod"/>
             </a:pPr>
             <a:r>
+              <a:rPr lang="en" b="1" dirty="0">
+                <a:solidFill>
+                  <a:schemeClr val="dk1"/>
+                </a:solidFill>
+              </a:rPr>
+              <a:t>Presentation</a:t>
+            </a:r>
+            <a:r>
               <a:rPr lang="en" dirty="0">
                 <a:solidFill>
                   <a:schemeClr val="dk1"/>
                 </a:solidFill>
               </a:rPr>
-              <a:t>Project Presentation - (5 teams) 8 points</a:t>
+              <a:t> - 20 points</a:t>
+            </a:r>
+          </a:p>
+          <a:p>
+            <a:pPr lvl="1">
+              <a:buClr>
+                <a:schemeClr val="dk1"/>
+              </a:buClr>
+            </a:pPr>
+            <a:r>
+              <a:rPr lang="en" dirty="0">
+                <a:solidFill>
+                  <a:schemeClr val="dk1"/>
+                </a:solidFill>
+              </a:rPr>
+              <a:t>Time allocated 7 minutes per student, 2 minutes </a:t>
+            </a:r>
+            <a:r>
+              <a:rPr lang="en" dirty="0" err="1">
+                <a:solidFill>
+                  <a:schemeClr val="dk1"/>
+                </a:solidFill>
+              </a:rPr>
+              <a:t>QnA</a:t>
+            </a:r>
+            <a:r>
+              <a:rPr lang="en" dirty="0">
+                <a:solidFill>
+                  <a:schemeClr val="dk1"/>
+                </a:solidFill>
+              </a:rPr>
+              <a:t>. </a:t>
+            </a:r>
+          </a:p>
+          <a:p>
+            <a:pPr lvl="1">
+              <a:buClr>
+                <a:schemeClr val="dk1"/>
+              </a:buClr>
+            </a:pPr>
+            <a:r>
+              <a:rPr lang="en" dirty="0">
+                <a:solidFill>
+                  <a:schemeClr val="dk1"/>
+                </a:solidFill>
+              </a:rPr>
+              <a:t>Timed. Starts at 8am </a:t>
+            </a:r>
+            <a:r>
+              <a:rPr lang="en" i="1" dirty="0">
+                <a:solidFill>
+                  <a:schemeClr val="dk1"/>
+                </a:solidFill>
+              </a:rPr>
+              <a:t>sharp</a:t>
+            </a:r>
+            <a:r>
+              <a:rPr lang="en" dirty="0">
+                <a:solidFill>
+                  <a:schemeClr val="dk1"/>
+                </a:solidFill>
+              </a:rPr>
+              <a:t>. Dates in course Syllabus.</a:t>
+            </a:r>
+          </a:p>
+          <a:p>
+            <a:pPr marL="457200" lvl="0" indent="-342900" algn="l" rtl="0">
+              <a:spcBef>
+                <a:spcPts val="0"/>
+              </a:spcBef>
+              <a:spcAft>
+                <a:spcPts val="0"/>
+              </a:spcAft>
+              <a:buClr>
+                <a:schemeClr val="dk1"/>
+              </a:buClr>
+              <a:buSzPts val="1800"/>
+              <a:buAutoNum type="arabicPeriod"/>
+            </a:pPr>
+            <a:endParaRPr lang="en" dirty="0">
+              <a:solidFill>
+                <a:schemeClr val="dk1"/>
+              </a:solidFill>
+            </a:endParaRPr>
+          </a:p>
+          <a:p>
+            <a:pPr marL="114300" lvl="0" indent="0" algn="l" rtl="0">
+              <a:spcBef>
+                <a:spcPts val="0"/>
+              </a:spcBef>
+              <a:spcAft>
+                <a:spcPts val="0"/>
+              </a:spcAft>
+              <a:buClr>
+                <a:schemeClr val="dk1"/>
+              </a:buClr>
+              <a:buSzPts val="1800"/>
+              <a:buNone/>
+            </a:pPr>
+            <a:r>
+              <a:rPr lang="en" dirty="0">
+                <a:solidFill>
+                  <a:srgbClr val="FF0000"/>
+                </a:solidFill>
+              </a:rPr>
+              <a:t>Note: Individual project – no groups allowed.</a:t>
             </a:r>
           </a:p>
         </p:txBody>
@@ -6464,10 +6644,18 @@
               <a:buNone/>
             </a:pPr>
             <a:r>
-              <a:rPr lang="en" sz="1600" b="1"/>
-              <a:t>Ipython notebook Submission Specifications (20)</a:t>
+              <a:rPr lang="en" sz="1600" b="1" dirty="0"/>
+              <a:t>CODE: </a:t>
             </a:r>
-            <a:endParaRPr sz="1600" b="1"/>
+            <a:r>
+              <a:rPr lang="en" sz="1600" b="1" dirty="0" err="1"/>
+              <a:t>Ipython</a:t>
+            </a:r>
+            <a:r>
+              <a:rPr lang="en" sz="1600" b="1" dirty="0"/>
+              <a:t> notebook Submission Specifications (30)</a:t>
+            </a:r>
+            <a:endParaRPr sz="1600" b="1" dirty="0"/>
           </a:p>
         </p:txBody>
       </p:sp>
@@ -6478,14 +6666,14 @@
           <p:nvPr>
             <p:extLst>
               <p:ext uri="{D42A27DB-BD31-4B8C-83A1-F6EECF244321}">
-                <p14:modId xmlns:p14="http://schemas.microsoft.com/office/powerpoint/2010/main" val="1009729611"/>
+                <p14:modId xmlns:p14="http://schemas.microsoft.com/office/powerpoint/2010/main" val="2443225925"/>
               </p:ext>
             </p:extLst>
           </p:nvPr>
         </p:nvGraphicFramePr>
         <p:xfrm>
-          <a:off x="0" y="326849"/>
-          <a:ext cx="9144000" cy="4793155"/>
+          <a:off x="62820" y="319869"/>
+          <a:ext cx="9081180" cy="4946021"/>
         </p:xfrm>
         <a:graphic>
           <a:graphicData uri="http://schemas.openxmlformats.org/drawingml/2006/table">
@@ -6495,28 +6683,28 @@
                 <a:tableStyleId>{518ADEEC-936C-4E9B-8B02-031A8C925C3E}</a:tableStyleId>
               </a:tblPr>
               <a:tblGrid>
-                <a:gridCol w="1124925">
+                <a:gridCol w="755610">
                   <a:extLst>
                     <a:ext uri="{9D8B030D-6E8A-4147-A177-3AD203B41FA5}">
                       <a16:colId xmlns:a16="http://schemas.microsoft.com/office/drawing/2014/main" val="20000"/>
                     </a:ext>
                   </a:extLst>
                 </a:gridCol>
-                <a:gridCol w="2637450">
+                <a:gridCol w="2636746">
                   <a:extLst>
                     <a:ext uri="{9D8B030D-6E8A-4147-A177-3AD203B41FA5}">
                       <a16:colId xmlns:a16="http://schemas.microsoft.com/office/drawing/2014/main" val="20001"/>
                     </a:ext>
                   </a:extLst>
                 </a:gridCol>
-                <a:gridCol w="2744100">
+                <a:gridCol w="2854882">
                   <a:extLst>
                     <a:ext uri="{9D8B030D-6E8A-4147-A177-3AD203B41FA5}">
                       <a16:colId xmlns:a16="http://schemas.microsoft.com/office/drawing/2014/main" val="20002"/>
                     </a:ext>
                   </a:extLst>
                 </a:gridCol>
-                <a:gridCol w="2637525">
+                <a:gridCol w="2833942">
                   <a:extLst>
                     <a:ext uri="{9D8B030D-6E8A-4147-A177-3AD203B41FA5}">
                       <a16:colId xmlns:a16="http://schemas.microsoft.com/office/drawing/2014/main" val="20003"/>
@@ -6545,17 +6733,17 @@
                         <a:buNone/>
                       </a:pPr>
                       <a:r>
-                        <a:rPr lang="en" sz="1200" b="1">
+                        <a:rPr lang="en" sz="1100" b="1">
                           <a:solidFill>
                             <a:schemeClr val="dk1"/>
                           </a:solidFill>
                         </a:rPr>
                         <a:t>(Points)</a:t>
                       </a:r>
-                      <a:endParaRPr sz="1200" b="1"/>
+                      <a:endParaRPr sz="1100" b="1"/>
                     </a:p>
                   </a:txBody>
-                  <a:tcPr marL="91425" marR="91425" marT="91425" marB="0"/>
+                  <a:tcPr marL="45720" marR="45720" marB="0"/>
                 </a:tc>
                 <a:tc>
                   <a:txBody>
@@ -6572,13 +6760,13 @@
                         <a:buNone/>
                       </a:pPr>
                       <a:r>
-                        <a:rPr lang="en" sz="1200" b="1"/>
+                        <a:rPr lang="en" sz="1100" b="1"/>
                         <a:t>0-50%</a:t>
                       </a:r>
-                      <a:endParaRPr sz="1200" b="1"/>
+                      <a:endParaRPr sz="1100" b="1"/>
                     </a:p>
                   </a:txBody>
-                  <a:tcPr marL="91425" marR="91425" marT="91425" marB="0"/>
+                  <a:tcPr marL="45720" marR="45720" marB="0"/>
                 </a:tc>
                 <a:tc>
                   <a:txBody>
@@ -6595,13 +6783,13 @@
                         <a:buNone/>
                       </a:pPr>
                       <a:r>
-                        <a:rPr lang="en" sz="1200" b="1"/>
+                        <a:rPr lang="en" sz="1100" b="1" dirty="0"/>
                         <a:t>50-75%</a:t>
                       </a:r>
-                      <a:endParaRPr sz="1200" b="1"/>
+                      <a:endParaRPr sz="1100" b="1" dirty="0"/>
                     </a:p>
                   </a:txBody>
-                  <a:tcPr marL="91425" marR="91425" marT="91425" marB="0"/>
+                  <a:tcPr marL="45720" marR="45720" marB="0"/>
                 </a:tc>
                 <a:tc>
                   <a:txBody>
@@ -6618,13 +6806,13 @@
                         <a:buNone/>
                       </a:pPr>
                       <a:r>
-                        <a:rPr lang="en" sz="1200" b="1"/>
+                        <a:rPr lang="en" sz="1100" b="1"/>
                         <a:t>75-100%</a:t>
                       </a:r>
-                      <a:endParaRPr sz="1200" b="1"/>
+                      <a:endParaRPr sz="1100" b="1"/>
                     </a:p>
                   </a:txBody>
-                  <a:tcPr marL="91425" marR="91425" marT="91425" marB="0"/>
+                  <a:tcPr marL="45720" marR="45720" marB="0"/>
                 </a:tc>
                 <a:extLst>
                   <a:ext uri="{0D108BD9-81ED-4DB2-BD59-A6C34878D82A}">
@@ -6648,21 +6836,21 @@
                         <a:buNone/>
                       </a:pPr>
                       <a:r>
-                        <a:rPr lang="en" sz="1100" dirty="0">
+                        <a:rPr lang="en" sz="900" dirty="0">
                           <a:solidFill>
                             <a:schemeClr val="dk1"/>
                           </a:solidFill>
                         </a:rPr>
-                        <a:t>Problem Description (2)</a:t>
+                        <a:t>Problem Description (3)</a:t>
                       </a:r>
-                      <a:endParaRPr sz="1100" dirty="0">
+                      <a:endParaRPr sz="900" dirty="0">
                         <a:solidFill>
                           <a:schemeClr val="dk1"/>
                         </a:solidFill>
                       </a:endParaRPr>
                     </a:p>
                   </a:txBody>
-                  <a:tcPr marL="91425" marR="91425" marT="91425" marB="0"/>
+                  <a:tcPr marL="45720" marR="45720" marB="0"/>
                 </a:tc>
                 <a:tc>
                   <a:txBody>
@@ -6679,21 +6867,21 @@
                         <a:buNone/>
                       </a:pPr>
                       <a:r>
-                        <a:rPr lang="en" sz="1100" dirty="0">
+                        <a:rPr lang="en" sz="1050" dirty="0">
                           <a:solidFill>
                             <a:schemeClr val="dk1"/>
                           </a:solidFill>
                         </a:rPr>
                         <a:t>Unrelated, simplistic, unmotivating</a:t>
                       </a:r>
-                      <a:endParaRPr sz="1100" dirty="0">
+                      <a:endParaRPr sz="1050" dirty="0">
                         <a:solidFill>
                           <a:schemeClr val="dk1"/>
                         </a:solidFill>
                       </a:endParaRPr>
                     </a:p>
                   </a:txBody>
-                  <a:tcPr marL="91425" marR="91425" marT="91425" marB="0"/>
+                  <a:tcPr marL="45720" marR="45720" marB="0"/>
                 </a:tc>
                 <a:tc>
                   <a:txBody>
@@ -6710,21 +6898,21 @@
                         <a:buNone/>
                       </a:pPr>
                       <a:r>
-                        <a:rPr lang="en" sz="1100" dirty="0">
+                        <a:rPr lang="en" sz="1050" dirty="0">
                           <a:solidFill>
                             <a:schemeClr val="dk1"/>
                           </a:solidFill>
                         </a:rPr>
                         <a:t>Appropriate, motivated</a:t>
                       </a:r>
-                      <a:endParaRPr sz="1100" dirty="0">
+                      <a:endParaRPr sz="1050" dirty="0">
                         <a:solidFill>
                           <a:schemeClr val="dk1"/>
                         </a:solidFill>
                       </a:endParaRPr>
                     </a:p>
                   </a:txBody>
-                  <a:tcPr marL="91425" marR="91425" marT="91425" marB="0"/>
+                  <a:tcPr marL="45720" marR="45720" marB="0"/>
                 </a:tc>
                 <a:tc>
                   <a:txBody>
@@ -6741,21 +6929,21 @@
                         <a:buNone/>
                       </a:pPr>
                       <a:r>
-                        <a:rPr lang="en" sz="1100" dirty="0">
+                        <a:rPr lang="en" sz="1050" dirty="0">
                           <a:solidFill>
                             <a:schemeClr val="dk1"/>
                           </a:solidFill>
                         </a:rPr>
-                        <a:t>Motivated, interesting, Insightful, and Novel.</a:t>
+                        <a:t>Motivated, interesting, Insightful.</a:t>
                       </a:r>
-                      <a:endParaRPr sz="1100" dirty="0">
+                      <a:endParaRPr sz="1050" dirty="0">
                         <a:solidFill>
                           <a:schemeClr val="dk1"/>
                         </a:solidFill>
                       </a:endParaRPr>
                     </a:p>
                   </a:txBody>
-                  <a:tcPr marL="91425" marR="91425" marT="91425" marB="0"/>
+                  <a:tcPr marL="45720" marR="45720" marB="0"/>
                 </a:tc>
                 <a:extLst>
                   <a:ext uri="{0D108BD9-81ED-4DB2-BD59-A6C34878D82A}">
@@ -6779,114 +6967,317 @@
                         <a:buNone/>
                       </a:pPr>
                       <a:r>
-                        <a:rPr lang="en" sz="1100" dirty="0">
+                        <a:rPr lang="en" sz="900" dirty="0">
                           <a:solidFill>
                             <a:schemeClr val="dk1"/>
                           </a:solidFill>
                         </a:rPr>
-                        <a:t>Steps in Assignment (12)</a:t>
+                        <a:t>Code for Models (15)</a:t>
                       </a:r>
-                      <a:endParaRPr sz="1100" dirty="0">
+                      <a:endParaRPr sz="900" dirty="0">
                         <a:solidFill>
                           <a:schemeClr val="dk1"/>
                         </a:solidFill>
                       </a:endParaRPr>
                     </a:p>
                   </a:txBody>
-                  <a:tcPr marL="91425" marR="91425" marT="91425" marB="0"/>
+                  <a:tcPr marL="45720" marR="45720" marB="0"/>
                 </a:tc>
                 <a:tc>
                   <a:txBody>
                     <a:bodyPr/>
                     <a:lstStyle/>
                     <a:p>
-                      <a:pPr marL="0" lvl="0" indent="0" algn="l" rtl="0">
+                      <a:pPr marL="171450" lvl="0" indent="-171450" algn="l" rtl="0">
                         <a:spcBef>
                           <a:spcPts val="0"/>
                         </a:spcBef>
                         <a:spcAft>
                           <a:spcPts val="0"/>
                         </a:spcAft>
-                        <a:buNone/>
+                        <a:buFont typeface="Arial" panose="020B0604020202020204" pitchFamily="34" charset="0"/>
+                        <a:buChar char="•"/>
                       </a:pPr>
                       <a:r>
-                        <a:rPr lang="en" sz="1100" dirty="0">
+                        <a:rPr lang="en" sz="1050" dirty="0">
                           <a:solidFill>
                             <a:schemeClr val="dk1"/>
                           </a:solidFill>
                         </a:rPr>
-                        <a:t>Overly simplistic or incomplete. Inappropriate choice of plots; poorly labeled plots; plots missing. Data not cleaned at all when needed. Model choices is not informative. Did not perform Hyperparameter tuning, performance measurement, non-descriptive choice of various parameters.</a:t>
+                        <a:t>Overly simplistic or incomplete. Inappropriate choice of plots; poorly labeled plots; plots missing. </a:t>
                       </a:r>
-                      <a:endParaRPr sz="1100" dirty="0">
+                    </a:p>
+                    <a:p>
+                      <a:pPr marL="171450" lvl="0" indent="-171450" algn="l" rtl="0">
+                        <a:spcBef>
+                          <a:spcPts val="0"/>
+                        </a:spcBef>
+                        <a:spcAft>
+                          <a:spcPts val="0"/>
+                        </a:spcAft>
+                        <a:buFont typeface="Arial" panose="020B0604020202020204" pitchFamily="34" charset="0"/>
+                        <a:buChar char="•"/>
+                      </a:pPr>
+                      <a:r>
+                        <a:rPr lang="en" sz="1050" dirty="0">
+                          <a:solidFill>
+                            <a:schemeClr val="dk1"/>
+                          </a:solidFill>
+                        </a:rPr>
+                        <a:t>Data not cleaned at all when needed. </a:t>
+                      </a:r>
+                    </a:p>
+                    <a:p>
+                      <a:pPr marL="171450" lvl="0" indent="-171450" algn="l" rtl="0">
+                        <a:spcBef>
+                          <a:spcPts val="0"/>
+                        </a:spcBef>
+                        <a:spcAft>
+                          <a:spcPts val="0"/>
+                        </a:spcAft>
+                        <a:buFont typeface="Arial" panose="020B0604020202020204" pitchFamily="34" charset="0"/>
+                        <a:buChar char="•"/>
+                      </a:pPr>
+                      <a:r>
+                        <a:rPr lang="en" sz="1050" dirty="0">
+                          <a:solidFill>
+                            <a:schemeClr val="dk1"/>
+                          </a:solidFill>
+                        </a:rPr>
+                        <a:t>Model choices is not informative. </a:t>
+                      </a:r>
+                    </a:p>
+                    <a:p>
+                      <a:pPr marL="171450" lvl="0" indent="-171450" algn="l" rtl="0">
+                        <a:spcBef>
+                          <a:spcPts val="0"/>
+                        </a:spcBef>
+                        <a:spcAft>
+                          <a:spcPts val="0"/>
+                        </a:spcAft>
+                        <a:buFont typeface="Arial" panose="020B0604020202020204" pitchFamily="34" charset="0"/>
+                        <a:buChar char="•"/>
+                      </a:pPr>
+                      <a:r>
+                        <a:rPr lang="en" sz="1050" dirty="0">
+                          <a:solidFill>
+                            <a:schemeClr val="dk1"/>
+                          </a:solidFill>
+                        </a:rPr>
+                        <a:t>Did not perform Hyperparameter tuning, </a:t>
+                      </a:r>
+                    </a:p>
+                    <a:p>
+                      <a:pPr marL="171450" lvl="0" indent="-171450" algn="l" rtl="0">
+                        <a:spcBef>
+                          <a:spcPts val="0"/>
+                        </a:spcBef>
+                        <a:spcAft>
+                          <a:spcPts val="0"/>
+                        </a:spcAft>
+                        <a:buFont typeface="Arial" panose="020B0604020202020204" pitchFamily="34" charset="0"/>
+                        <a:buChar char="•"/>
+                      </a:pPr>
+                      <a:r>
+                        <a:rPr lang="en" sz="1050" dirty="0">
+                          <a:solidFill>
+                            <a:schemeClr val="dk1"/>
+                          </a:solidFill>
+                        </a:rPr>
+                        <a:t>Performance measurement, non-descriptive choice of various parameters.</a:t>
+                      </a:r>
+                      <a:endParaRPr sz="1050" dirty="0">
                         <a:solidFill>
                           <a:schemeClr val="dk1"/>
                         </a:solidFill>
                       </a:endParaRPr>
                     </a:p>
                   </a:txBody>
-                  <a:tcPr marL="91425" marR="91425" marT="91425" marB="0"/>
+                  <a:tcPr marL="45720" marR="45720" marB="0"/>
                 </a:tc>
                 <a:tc>
                   <a:txBody>
                     <a:bodyPr/>
                     <a:lstStyle/>
                     <a:p>
-                      <a:pPr marL="0" lvl="0" indent="0" algn="l" rtl="0">
+                      <a:pPr marL="171450" lvl="0" indent="-171450" algn="l" rtl="0">
                         <a:spcBef>
                           <a:spcPts val="0"/>
                         </a:spcBef>
                         <a:spcAft>
                           <a:spcPts val="0"/>
                         </a:spcAft>
-                        <a:buNone/>
+                        <a:buFont typeface="Arial" panose="020B0604020202020204" pitchFamily="34" charset="0"/>
+                        <a:buChar char="•"/>
                       </a:pPr>
                       <a:r>
-                        <a:rPr lang="en" sz="1100" dirty="0">
+                        <a:rPr lang="en" sz="1050" dirty="0">
                           <a:solidFill>
                             <a:schemeClr val="dk1"/>
                           </a:solidFill>
                         </a:rPr>
-                        <a:t>Analysis appropriate. Plots convey information but lack context for interpretation. Some Data cleaned when needed. Models work but choice somewhat informative. hyperparameter optimization done using functions without any intuition/logic. Some performance measurement, some descriptive choice of various parameters.</a:t>
+                        <a:t>Analysis appropriate. Plots convey information but lack context for interpretation. </a:t>
                       </a:r>
-                      <a:endParaRPr sz="1100" dirty="0">
+                    </a:p>
+                    <a:p>
+                      <a:pPr marL="171450" lvl="0" indent="-171450" algn="l" rtl="0">
+                        <a:spcBef>
+                          <a:spcPts val="0"/>
+                        </a:spcBef>
+                        <a:spcAft>
+                          <a:spcPts val="0"/>
+                        </a:spcAft>
+                        <a:buFont typeface="Arial" panose="020B0604020202020204" pitchFamily="34" charset="0"/>
+                        <a:buChar char="•"/>
+                      </a:pPr>
+                      <a:r>
+                        <a:rPr lang="en" sz="1050" dirty="0">
+                          <a:solidFill>
+                            <a:schemeClr val="dk1"/>
+                          </a:solidFill>
+                        </a:rPr>
+                        <a:t>Some Data cleaned when needed. </a:t>
+                      </a:r>
+                    </a:p>
+                    <a:p>
+                      <a:pPr marL="171450" lvl="0" indent="-171450" algn="l" rtl="0">
+                        <a:spcBef>
+                          <a:spcPts val="0"/>
+                        </a:spcBef>
+                        <a:spcAft>
+                          <a:spcPts val="0"/>
+                        </a:spcAft>
+                        <a:buFont typeface="Arial" panose="020B0604020202020204" pitchFamily="34" charset="0"/>
+                        <a:buChar char="•"/>
+                      </a:pPr>
+                      <a:r>
+                        <a:rPr lang="en" sz="1050" dirty="0">
+                          <a:solidFill>
+                            <a:schemeClr val="dk1"/>
+                          </a:solidFill>
+                        </a:rPr>
+                        <a:t>Models work but choice somewhat informative. </a:t>
+                      </a:r>
+                    </a:p>
+                    <a:p>
+                      <a:pPr marL="171450" lvl="0" indent="-171450" algn="l" rtl="0">
+                        <a:spcBef>
+                          <a:spcPts val="0"/>
+                        </a:spcBef>
+                        <a:spcAft>
+                          <a:spcPts val="0"/>
+                        </a:spcAft>
+                        <a:buFont typeface="Arial" panose="020B0604020202020204" pitchFamily="34" charset="0"/>
+                        <a:buChar char="•"/>
+                      </a:pPr>
+                      <a:r>
+                        <a:rPr lang="en" sz="1050" dirty="0">
+                          <a:solidFill>
+                            <a:schemeClr val="dk1"/>
+                          </a:solidFill>
+                        </a:rPr>
+                        <a:t>Hyperparameter optimization done using functions without any intuition/logic. </a:t>
+                      </a:r>
+                    </a:p>
+                    <a:p>
+                      <a:pPr marL="171450" lvl="0" indent="-171450" algn="l" rtl="0">
+                        <a:spcBef>
+                          <a:spcPts val="0"/>
+                        </a:spcBef>
+                        <a:spcAft>
+                          <a:spcPts val="0"/>
+                        </a:spcAft>
+                        <a:buFont typeface="Arial" panose="020B0604020202020204" pitchFamily="34" charset="0"/>
+                        <a:buChar char="•"/>
+                      </a:pPr>
+                      <a:r>
+                        <a:rPr lang="en" sz="1050" dirty="0">
+                          <a:solidFill>
+                            <a:schemeClr val="dk1"/>
+                          </a:solidFill>
+                        </a:rPr>
+                        <a:t>Some performance measurement, some descriptive choice of various parameters.</a:t>
+                      </a:r>
+                      <a:endParaRPr sz="1050" dirty="0">
                         <a:solidFill>
                           <a:schemeClr val="dk1"/>
                         </a:solidFill>
                       </a:endParaRPr>
                     </a:p>
                   </a:txBody>
-                  <a:tcPr marL="91425" marR="91425" marT="91425" marB="0"/>
+                  <a:tcPr marL="45720" marR="45720" marB="0"/>
                 </a:tc>
                 <a:tc>
                   <a:txBody>
                     <a:bodyPr/>
                     <a:lstStyle/>
                     <a:p>
-                      <a:pPr marL="0" lvl="0" indent="0" algn="l" rtl="0">
+                      <a:pPr marL="171450" lvl="0" indent="-171450" algn="l" rtl="0">
                         <a:spcBef>
                           <a:spcPts val="0"/>
                         </a:spcBef>
                         <a:spcAft>
                           <a:spcPts val="0"/>
                         </a:spcAft>
-                        <a:buNone/>
+                        <a:buFont typeface="Arial" panose="020B0604020202020204" pitchFamily="34" charset="0"/>
+                        <a:buChar char="•"/>
                       </a:pPr>
                       <a:r>
-                        <a:rPr lang="en" sz="1100" dirty="0">
+                        <a:rPr lang="en" sz="1050" dirty="0">
                           <a:solidFill>
                             <a:schemeClr val="dk1"/>
                           </a:solidFill>
                         </a:rPr>
-                        <a:t>Appropriate, Complete, Advanced, and Informative. Plots convey information correctly with adequate and appropriate reference information. Every step starting from data description to optimization of parameters, error minimization, distance measures etc.,  choice of models, explained clearly. Works seamlessly.</a:t>
+                        <a:t>Appropriate, Complete, Advanced, and Informative. Plots convey information correctly with adequate and appropriate reference information. </a:t>
                       </a:r>
-                      <a:endParaRPr sz="1100" dirty="0">
+                    </a:p>
+                    <a:p>
+                      <a:pPr marL="171450" lvl="0" indent="-171450" algn="l" rtl="0">
+                        <a:spcBef>
+                          <a:spcPts val="0"/>
+                        </a:spcBef>
+                        <a:spcAft>
+                          <a:spcPts val="0"/>
+                        </a:spcAft>
+                        <a:buFont typeface="Arial" panose="020B0604020202020204" pitchFamily="34" charset="0"/>
+                        <a:buChar char="•"/>
+                      </a:pPr>
+                      <a:r>
+                        <a:rPr lang="en" sz="1050" dirty="0">
+                          <a:solidFill>
+                            <a:schemeClr val="dk1"/>
+                          </a:solidFill>
+                        </a:rPr>
+                        <a:t>Every step starting from data description to optimization of parameters, error minimization, distance measures etc.,  choice of models, explained clearly. </a:t>
+                      </a:r>
+                    </a:p>
+                    <a:p>
+                      <a:pPr marL="171450" lvl="0" indent="-171450" algn="l" rtl="0">
+                        <a:spcBef>
+                          <a:spcPts val="0"/>
+                        </a:spcBef>
+                        <a:spcAft>
+                          <a:spcPts val="0"/>
+                        </a:spcAft>
+                        <a:buFont typeface="Arial" panose="020B0604020202020204" pitchFamily="34" charset="0"/>
+                        <a:buChar char="•"/>
+                      </a:pPr>
+                      <a:r>
+                        <a:rPr lang="en" sz="1050" dirty="0">
+                          <a:solidFill>
+                            <a:schemeClr val="dk1"/>
+                          </a:solidFill>
+                        </a:rPr>
+                        <a:t>Works seamlessly.</a:t>
+                      </a:r>
+                      <a:endParaRPr sz="1050" dirty="0">
                         <a:solidFill>
                           <a:schemeClr val="dk1"/>
                         </a:solidFill>
                       </a:endParaRPr>
                     </a:p>
                   </a:txBody>
-                  <a:tcPr marL="91425" marR="91425" marT="91425" marB="0"/>
+                  <a:tcPr marL="45720" marR="45720" marB="0"/>
                 </a:tc>
                 <a:extLst>
                   <a:ext uri="{0D108BD9-81ED-4DB2-BD59-A6C34878D82A}">
@@ -6910,21 +7301,21 @@
                         <a:buNone/>
                       </a:pPr>
                       <a:r>
-                        <a:rPr lang="en" sz="1100" dirty="0">
+                        <a:rPr lang="en" sz="900" dirty="0">
                           <a:solidFill>
                             <a:schemeClr val="dk1"/>
                           </a:solidFill>
                         </a:rPr>
-                        <a:t>Results (2)</a:t>
+                        <a:t>Results (5)</a:t>
                       </a:r>
-                      <a:endParaRPr sz="1100" dirty="0">
+                      <a:endParaRPr sz="900" dirty="0">
                         <a:solidFill>
                           <a:schemeClr val="dk1"/>
                         </a:solidFill>
                       </a:endParaRPr>
                     </a:p>
                   </a:txBody>
-                  <a:tcPr marL="91425" marR="91425" marT="91425" marB="0"/>
+                  <a:tcPr marL="45720" marR="45720" marB="0"/>
                 </a:tc>
                 <a:tc>
                   <a:txBody>
@@ -6944,21 +7335,21 @@
                         <a:buNone/>
                       </a:pPr>
                       <a:r>
-                        <a:rPr lang="en" sz="1100" dirty="0">
+                        <a:rPr lang="en" sz="1050" dirty="0">
                           <a:solidFill>
                             <a:schemeClr val="dk1"/>
                           </a:solidFill>
                         </a:rPr>
-                        <a:t>Conclusions are missing, incorrect, or not based on analysis. </a:t>
+                        <a:t>Written Description. Conclusions are missing, incorrect, or not based on analysis. </a:t>
                       </a:r>
-                      <a:endParaRPr sz="1100" dirty="0">
+                      <a:endParaRPr sz="1050" dirty="0">
                         <a:solidFill>
                           <a:schemeClr val="dk1"/>
                         </a:solidFill>
                       </a:endParaRPr>
                     </a:p>
                   </a:txBody>
-                  <a:tcPr marL="91425" marR="91425" marT="91425" marB="0"/>
+                  <a:tcPr marL="45720" marR="45720" marB="0"/>
                 </a:tc>
                 <a:tc>
                   <a:txBody>
@@ -6975,21 +7366,21 @@
                         <a:buNone/>
                       </a:pPr>
                       <a:r>
-                        <a:rPr lang="en" sz="1100" dirty="0">
+                        <a:rPr lang="en" sz="1050" dirty="0">
                           <a:solidFill>
                             <a:schemeClr val="dk1"/>
                           </a:solidFill>
                         </a:rPr>
-                        <a:t>Conclusions relevant, but partially correct or partially complete. </a:t>
+                        <a:t>Written Description. Conclusions relevant, but partially correct or partially complete. </a:t>
                       </a:r>
-                      <a:endParaRPr sz="1100" dirty="0">
+                      <a:endParaRPr sz="1050" dirty="0">
                         <a:solidFill>
                           <a:schemeClr val="dk1"/>
                         </a:solidFill>
                       </a:endParaRPr>
                     </a:p>
                   </a:txBody>
-                  <a:tcPr marL="91425" marR="91425" marT="91425" marB="0"/>
+                  <a:tcPr marL="45720" marR="45720" marB="0"/>
                 </a:tc>
                 <a:tc>
                   <a:txBody>
@@ -7006,21 +7397,21 @@
                         <a:buNone/>
                       </a:pPr>
                       <a:r>
-                        <a:rPr lang="en" sz="1100" dirty="0">
+                        <a:rPr lang="en" sz="1050" dirty="0">
                           <a:solidFill>
                             <a:schemeClr val="dk1"/>
                           </a:solidFill>
                         </a:rPr>
-                        <a:t>Relevant conclusions explicitly tied to analysis and to context. </a:t>
+                        <a:t>Written Description. Relevant conclusions explicitly tied to analysis and to context. </a:t>
                       </a:r>
-                      <a:endParaRPr sz="1100" dirty="0">
+                      <a:endParaRPr sz="1050" dirty="0">
                         <a:solidFill>
                           <a:schemeClr val="dk1"/>
                         </a:solidFill>
                       </a:endParaRPr>
                     </a:p>
                   </a:txBody>
-                  <a:tcPr marL="91425" marR="91425" marT="91425" marB="0"/>
+                  <a:tcPr marL="45720" marR="45720" marB="0"/>
                 </a:tc>
                 <a:extLst>
                   <a:ext uri="{0D108BD9-81ED-4DB2-BD59-A6C34878D82A}">
@@ -7044,21 +7435,21 @@
                         <a:buNone/>
                       </a:pPr>
                       <a:r>
-                        <a:rPr lang="en" sz="1100" dirty="0">
+                        <a:rPr lang="en" sz="900" dirty="0">
                           <a:solidFill>
                             <a:schemeClr val="dk1"/>
                           </a:solidFill>
                         </a:rPr>
-                        <a:t>Readability (3)</a:t>
+                        <a:t>Readability (5)</a:t>
                       </a:r>
-                      <a:endParaRPr sz="1100" dirty="0">
+                      <a:endParaRPr sz="900" dirty="0">
                         <a:solidFill>
                           <a:schemeClr val="dk1"/>
                         </a:solidFill>
                       </a:endParaRPr>
                     </a:p>
                   </a:txBody>
-                  <a:tcPr marL="91425" marR="91425" marT="91425" marB="0"/>
+                  <a:tcPr marL="45720" marR="45720" marB="0"/>
                 </a:tc>
                 <a:tc>
                   <a:txBody>
@@ -7075,21 +7466,78 @@
                         <a:buNone/>
                       </a:pPr>
                       <a:r>
-                        <a:rPr lang="en" sz="1100" dirty="0">
+                        <a:rPr lang="en" sz="1050" dirty="0">
                           <a:solidFill>
                             <a:schemeClr val="dk1"/>
                           </a:solidFill>
                         </a:rPr>
-                        <a:t>Code is messy and poorly organized; No comments added; unused or irrelevant code distracts when reading code. Variables and functions names are not helpful to understand code.</a:t>
+                        <a:t>Code is messy and poorly organized; </a:t>
                       </a:r>
-                      <a:endParaRPr sz="1100" dirty="0">
+                    </a:p>
+                    <a:p>
+                      <a:pPr marL="0" lvl="0" indent="0" algn="l" rtl="0">
+                        <a:spcBef>
+                          <a:spcPts val="0"/>
+                        </a:spcBef>
+                        <a:spcAft>
+                          <a:spcPts val="0"/>
+                        </a:spcAft>
+                        <a:buNone/>
+                      </a:pPr>
+                      <a:r>
+                        <a:rPr lang="en" sz="1050" dirty="0">
+                          <a:solidFill>
+                            <a:schemeClr val="dk1"/>
+                          </a:solidFill>
+                        </a:rPr>
+                        <a:t>No comments added; </a:t>
+                      </a:r>
+                    </a:p>
+                    <a:p>
+                      <a:pPr marL="0" lvl="0" indent="0" algn="l" rtl="0">
+                        <a:spcBef>
+                          <a:spcPts val="0"/>
+                        </a:spcBef>
+                        <a:spcAft>
+                          <a:spcPts val="0"/>
+                        </a:spcAft>
+                        <a:buNone/>
+                      </a:pPr>
+                      <a:r>
+                        <a:rPr lang="en" sz="1050" dirty="0">
+                          <a:solidFill>
+                            <a:schemeClr val="dk1"/>
+                          </a:solidFill>
+                        </a:rPr>
+                        <a:t>unused or irrelevant code distracts when reading code.</a:t>
+                      </a:r>
+                    </a:p>
+                    <a:p>
+                      <a:pPr marL="0" lvl="0" indent="0" algn="l" rtl="0">
+                        <a:spcBef>
+                          <a:spcPts val="0"/>
+                        </a:spcBef>
+                        <a:spcAft>
+                          <a:spcPts val="0"/>
+                        </a:spcAft>
+                        <a:buNone/>
+                      </a:pPr>
+                      <a:r>
+                        <a:rPr lang="en" sz="1050" dirty="0">
+                          <a:solidFill>
+                            <a:schemeClr val="dk1"/>
+                          </a:solidFill>
+                        </a:rPr>
+                        <a:t>Variables and functions names are not helpful to understand code.</a:t>
+                      </a:r>
+                      <a:endParaRPr sz="1050" dirty="0">
                         <a:solidFill>
                           <a:schemeClr val="dk1"/>
                         </a:solidFill>
                       </a:endParaRPr>
                     </a:p>
                   </a:txBody>
-                  <a:tcPr marL="91425" marR="91425" marT="91425" marB="0"/>
+                  <a:tcPr marL="45720" marR="45720" marB="0"/>
                 </a:tc>
                 <a:tc>
                   <a:txBody>
@@ -7106,21 +7554,59 @@
                         <a:buNone/>
                       </a:pPr>
                       <a:r>
-                        <a:rPr lang="en" sz="1100" dirty="0">
+                        <a:rPr lang="en" sz="1050" dirty="0">
                           <a:solidFill>
                             <a:schemeClr val="dk1"/>
                           </a:solidFill>
                         </a:rPr>
-                        <a:t>Code is reasonably well organized.  There is little unused or irrelevant code, or this code has been moved out of the main project files. Variable and function names generally meaningful and helpful for understanding.</a:t>
+                        <a:t>Code is reasonably well organized.  </a:t>
                       </a:r>
-                      <a:endParaRPr sz="1100" dirty="0">
+                    </a:p>
+                    <a:p>
+                      <a:pPr marL="0" lvl="0" indent="0" algn="l" rtl="0">
+                        <a:spcBef>
+                          <a:spcPts val="0"/>
+                        </a:spcBef>
+                        <a:spcAft>
+                          <a:spcPts val="0"/>
+                        </a:spcAft>
+                        <a:buNone/>
+                      </a:pPr>
+                      <a:r>
+                        <a:rPr lang="en" sz="1050" dirty="0">
+                          <a:solidFill>
+                            <a:schemeClr val="dk1"/>
+                          </a:solidFill>
+                        </a:rPr>
+                        <a:t>There is little unused or irrelevant code, or this code has been moved out of the main project files. </a:t>
+                      </a:r>
+                    </a:p>
+                    <a:p>
+                      <a:pPr marL="0" lvl="0" indent="0" algn="l" rtl="0">
+                        <a:spcBef>
+                          <a:spcPts val="0"/>
+                        </a:spcBef>
+                        <a:spcAft>
+                          <a:spcPts val="0"/>
+                        </a:spcAft>
+                        <a:buNone/>
+                      </a:pPr>
+                      <a:r>
+                        <a:rPr lang="en" sz="1050" dirty="0">
+                          <a:solidFill>
+                            <a:schemeClr val="dk1"/>
+                          </a:solidFill>
+                        </a:rPr>
+                        <a:t>Variable and function names generally meaningful and helpful for understanding.</a:t>
+                      </a:r>
+                      <a:endParaRPr sz="1050" dirty="0">
                         <a:solidFill>
                           <a:schemeClr val="dk1"/>
                         </a:solidFill>
                       </a:endParaRPr>
                     </a:p>
                   </a:txBody>
-                  <a:tcPr marL="91425" marR="91425" marT="91425" marB="0"/>
+                  <a:tcPr marL="45720" marR="45720" marB="0"/>
                 </a:tc>
                 <a:tc>
                   <a:txBody>
@@ -7137,21 +7623,78 @@
                         <a:buNone/>
                       </a:pPr>
                       <a:r>
-                        <a:rPr lang="en" sz="1100" dirty="0">
+                        <a:rPr lang="en" sz="1050" dirty="0">
                           <a:solidFill>
                             <a:schemeClr val="dk1"/>
                           </a:solidFill>
                         </a:rPr>
-                        <a:t>Code very well organized.  No irrelevant or distracting code. Variable and function names have clear relationship to their purpose in the code. Code is easy to read and understand.</a:t>
+                        <a:t>Code very well organized.  </a:t>
                       </a:r>
-                      <a:endParaRPr sz="1100" dirty="0">
+                    </a:p>
+                    <a:p>
+                      <a:pPr marL="0" lvl="0" indent="0" algn="l" rtl="0">
+                        <a:spcBef>
+                          <a:spcPts val="0"/>
+                        </a:spcBef>
+                        <a:spcAft>
+                          <a:spcPts val="0"/>
+                        </a:spcAft>
+                        <a:buNone/>
+                      </a:pPr>
+                      <a:r>
+                        <a:rPr lang="en" sz="1050" dirty="0">
+                          <a:solidFill>
+                            <a:schemeClr val="dk1"/>
+                          </a:solidFill>
+                        </a:rPr>
+                        <a:t>No irrelevant or distracting code. </a:t>
+                      </a:r>
+                    </a:p>
+                    <a:p>
+                      <a:pPr marL="0" lvl="0" indent="0" algn="l" rtl="0">
+                        <a:spcBef>
+                          <a:spcPts val="0"/>
+                        </a:spcBef>
+                        <a:spcAft>
+                          <a:spcPts val="0"/>
+                        </a:spcAft>
+                        <a:buNone/>
+                      </a:pPr>
+                      <a:r>
+                        <a:rPr lang="en" sz="1050" dirty="0">
+                          <a:solidFill>
+                            <a:schemeClr val="dk1"/>
+                          </a:solidFill>
+                        </a:rPr>
+                        <a:t>Variable and function names have clear relationship to their purpose in the code. </a:t>
+                      </a:r>
+                    </a:p>
+                    <a:p>
+                      <a:pPr marL="0" lvl="0" indent="0" algn="l" rtl="0">
+                        <a:spcBef>
+                          <a:spcPts val="0"/>
+                        </a:spcBef>
+                        <a:spcAft>
+                          <a:spcPts val="0"/>
+                        </a:spcAft>
+                        <a:buNone/>
+                      </a:pPr>
+                      <a:r>
+                        <a:rPr lang="en" sz="1050" dirty="0">
+                          <a:solidFill>
+                            <a:schemeClr val="dk1"/>
+                          </a:solidFill>
+                        </a:rPr>
+                        <a:t>Code is easy to read and understand.</a:t>
+                      </a:r>
+                      <a:endParaRPr sz="1050" dirty="0">
                         <a:solidFill>
                           <a:schemeClr val="dk1"/>
                         </a:solidFill>
                       </a:endParaRPr>
                     </a:p>
                   </a:txBody>
-                  <a:tcPr marL="91425" marR="91425" marT="91425" marB="0"/>
+                  <a:tcPr marL="45720" marR="45720" marB="0"/>
                 </a:tc>
                 <a:extLst>
                   <a:ext uri="{0D108BD9-81ED-4DB2-BD59-A6C34878D82A}">
@@ -7175,21 +7718,21 @@
                         <a:buNone/>
                       </a:pPr>
                       <a:r>
-                        <a:rPr lang="en" sz="1100" dirty="0">
+                        <a:rPr lang="en" sz="900" dirty="0">
                           <a:solidFill>
                             <a:schemeClr val="dk1"/>
                           </a:solidFill>
                         </a:rPr>
-                        <a:t>Reproducibility (1)</a:t>
+                        <a:t>Reproducibility (2)</a:t>
                       </a:r>
-                      <a:endParaRPr sz="1100" dirty="0">
+                      <a:endParaRPr sz="900" dirty="0">
                         <a:solidFill>
                           <a:schemeClr val="dk1"/>
                         </a:solidFill>
                       </a:endParaRPr>
                     </a:p>
                   </a:txBody>
-                  <a:tcPr marL="91425" marR="91425" marT="91425" marB="0"/>
+                  <a:tcPr marL="45720" marR="45720" marB="0"/>
                 </a:tc>
                 <a:tc>
                   <a:txBody>
@@ -7206,21 +7749,30 @@
                         <a:buNone/>
                       </a:pPr>
                       <a:r>
-                        <a:rPr lang="en" sz="1100" dirty="0">
+                        <a:rPr lang="en" sz="1050" dirty="0">
                           <a:solidFill>
                             <a:schemeClr val="dk1"/>
                           </a:solidFill>
                         </a:rPr>
-                        <a:t>Code didn't run. No readme.</a:t>
+                        <a:t>No Readme using markdown. </a:t>
                       </a:r>
-                      <a:endParaRPr sz="1100" dirty="0">
+                      <a:r>
+                        <a:rPr lang="en" sz="1050" dirty="0">
+                          <a:solidFill>
+                            <a:schemeClr val="dk1"/>
+                          </a:solidFill>
+                          <a:hlinkClick r:id="rId3"/>
+                        </a:rPr>
+                        <a:t>Use link for help</a:t>
+                      </a:r>
+                      <a:endParaRPr sz="1050" dirty="0">
                         <a:solidFill>
                           <a:schemeClr val="dk1"/>
                         </a:solidFill>
                       </a:endParaRPr>
                     </a:p>
                   </a:txBody>
-                  <a:tcPr marL="91425" marR="91425" marT="91425" marB="0"/>
+                  <a:tcPr marL="45720" marR="45720" marB="0"/>
                 </a:tc>
                 <a:tc>
                   <a:txBody>
@@ -7237,21 +7789,21 @@
                         <a:buNone/>
                       </a:pPr>
                       <a:r>
-                        <a:rPr lang="en-US" sz="1100" dirty="0">
+                        <a:rPr lang="en-US" sz="1050" dirty="0">
                           <a:solidFill>
                             <a:schemeClr val="dk1"/>
                           </a:solidFill>
                         </a:rPr>
                         <a:t>-</a:t>
                       </a:r>
-                      <a:endParaRPr sz="1100" dirty="0">
+                      <a:endParaRPr sz="1050" dirty="0">
                         <a:solidFill>
                           <a:schemeClr val="dk1"/>
                         </a:solidFill>
                       </a:endParaRPr>
                     </a:p>
                   </a:txBody>
-                  <a:tcPr marL="91425" marR="91425" marT="91425" marB="0"/>
+                  <a:tcPr marL="45720" marR="45720" marB="0"/>
                 </a:tc>
                 <a:tc>
                   <a:txBody>
@@ -7273,21 +7825,21 @@
                         <a:buNone/>
                       </a:pPr>
                       <a:r>
-                        <a:rPr lang="en" sz="1100" dirty="0">
+                        <a:rPr lang="en" sz="1050" dirty="0">
                           <a:solidFill>
                             <a:schemeClr val="dk1"/>
                           </a:solidFill>
                         </a:rPr>
                         <a:t>Readme well documented. Steps to run the code and any explanation needed is clearly written.</a:t>
                       </a:r>
-                      <a:endParaRPr sz="1100" dirty="0">
+                      <a:endParaRPr sz="1050" dirty="0">
                         <a:solidFill>
                           <a:schemeClr val="dk1"/>
                         </a:solidFill>
                       </a:endParaRPr>
                     </a:p>
                   </a:txBody>
-                  <a:tcPr marL="91425" marR="91425" marT="91425" marB="0"/>
+                  <a:tcPr marL="45720" marR="45720" marB="0"/>
                 </a:tc>
                 <a:extLst>
                   <a:ext uri="{0D108BD9-81ED-4DB2-BD59-A6C34878D82A}">
@@ -7308,6 +7860,1566 @@
 </file>
 
 <file path=ppt/slides/slide4.xml><?xml version="1.0" encoding="utf-8"?>
+<p:sld xmlns:a="http://schemas.openxmlformats.org/drawingml/2006/main" xmlns:r="http://schemas.openxmlformats.org/officeDocument/2006/relationships" xmlns:p="http://schemas.openxmlformats.org/presentationml/2006/main">
+  <p:cSld>
+    <p:spTree>
+      <p:nvGrpSpPr>
+        <p:cNvPr id="1" name="Shape 64"/>
+        <p:cNvGrpSpPr/>
+        <p:nvPr/>
+      </p:nvGrpSpPr>
+      <p:grpSpPr>
+        <a:xfrm>
+          <a:off x="0" y="0"/>
+          <a:ext cx="0" cy="0"/>
+          <a:chOff x="0" y="0"/>
+          <a:chExt cx="0" cy="0"/>
+        </a:xfrm>
+      </p:grpSpPr>
+      <p:sp>
+        <p:nvSpPr>
+          <p:cNvPr id="65" name="Google Shape;65;p15"/>
+          <p:cNvSpPr txBox="1">
+            <a:spLocks noGrp="1"/>
+          </p:cNvSpPr>
+          <p:nvPr>
+            <p:ph type="title"/>
+          </p:nvPr>
+        </p:nvSpPr>
+        <p:spPr>
+          <a:xfrm>
+            <a:off x="304800" y="0"/>
+            <a:ext cx="8520600" cy="337200"/>
+          </a:xfrm>
+          <a:prstGeom prst="rect">
+            <a:avLst/>
+          </a:prstGeom>
+        </p:spPr>
+        <p:txBody>
+          <a:bodyPr spcFirstLastPara="1" wrap="square" lIns="91425" tIns="91425" rIns="91425" bIns="91425" anchor="t" anchorCtr="0">
+            <a:normAutofit fontScale="90000"/>
+          </a:bodyPr>
+          <a:lstStyle/>
+          <a:p>
+            <a:pPr marL="0" lvl="0" indent="0" algn="ctr" rtl="0">
+              <a:spcBef>
+                <a:spcPts val="0"/>
+              </a:spcBef>
+              <a:spcAft>
+                <a:spcPts val="0"/>
+              </a:spcAft>
+              <a:buSzPct val="55687"/>
+              <a:buNone/>
+            </a:pPr>
+            <a:r>
+              <a:rPr lang="en" sz="1600" b="1" dirty="0" err="1">
+                <a:solidFill>
+                  <a:schemeClr val="bg2">
+                    <a:lumMod val="40000"/>
+                    <a:lumOff val="60000"/>
+                  </a:schemeClr>
+                </a:solidFill>
+              </a:rPr>
+              <a:t>Ipython</a:t>
+            </a:r>
+            <a:r>
+              <a:rPr lang="en" sz="1600" b="1" dirty="0">
+                <a:solidFill>
+                  <a:schemeClr val="bg2">
+                    <a:lumMod val="40000"/>
+                    <a:lumOff val="60000"/>
+                  </a:schemeClr>
+                </a:solidFill>
+              </a:rPr>
+              <a:t> notebook Submission Specifications (30)</a:t>
+            </a:r>
+            <a:endParaRPr sz="1600" b="1" dirty="0">
+              <a:solidFill>
+                <a:schemeClr val="bg2">
+                  <a:lumMod val="40000"/>
+                  <a:lumOff val="60000"/>
+                </a:schemeClr>
+              </a:solidFill>
+            </a:endParaRPr>
+          </a:p>
+        </p:txBody>
+      </p:sp>
+      <p:graphicFrame>
+        <p:nvGraphicFramePr>
+          <p:cNvPr id="66" name="Google Shape;66;p15"/>
+          <p:cNvGraphicFramePr/>
+          <p:nvPr>
+            <p:extLst>
+              <p:ext uri="{D42A27DB-BD31-4B8C-83A1-F6EECF244321}">
+                <p14:modId xmlns:p14="http://schemas.microsoft.com/office/powerpoint/2010/main" val="2581116628"/>
+              </p:ext>
+            </p:extLst>
+          </p:nvPr>
+        </p:nvGraphicFramePr>
+        <p:xfrm>
+          <a:off x="62820" y="319869"/>
+          <a:ext cx="9081180" cy="4946021"/>
+        </p:xfrm>
+        <a:graphic>
+          <a:graphicData uri="http://schemas.openxmlformats.org/drawingml/2006/table">
+            <a:tbl>
+              <a:tblPr>
+                <a:noFill/>
+                <a:tableStyleId>{518ADEEC-936C-4E9B-8B02-031A8C925C3E}</a:tableStyleId>
+              </a:tblPr>
+              <a:tblGrid>
+                <a:gridCol w="755610">
+                  <a:extLst>
+                    <a:ext uri="{9D8B030D-6E8A-4147-A177-3AD203B41FA5}">
+                      <a16:colId xmlns:a16="http://schemas.microsoft.com/office/drawing/2014/main" val="20000"/>
+                    </a:ext>
+                  </a:extLst>
+                </a:gridCol>
+                <a:gridCol w="2636746">
+                  <a:extLst>
+                    <a:ext uri="{9D8B030D-6E8A-4147-A177-3AD203B41FA5}">
+                      <a16:colId xmlns:a16="http://schemas.microsoft.com/office/drawing/2014/main" val="20001"/>
+                    </a:ext>
+                  </a:extLst>
+                </a:gridCol>
+                <a:gridCol w="2854882">
+                  <a:extLst>
+                    <a:ext uri="{9D8B030D-6E8A-4147-A177-3AD203B41FA5}">
+                      <a16:colId xmlns:a16="http://schemas.microsoft.com/office/drawing/2014/main" val="20002"/>
+                    </a:ext>
+                  </a:extLst>
+                </a:gridCol>
+                <a:gridCol w="2833942">
+                  <a:extLst>
+                    <a:ext uri="{9D8B030D-6E8A-4147-A177-3AD203B41FA5}">
+                      <a16:colId xmlns:a16="http://schemas.microsoft.com/office/drawing/2014/main" val="20003"/>
+                    </a:ext>
+                  </a:extLst>
+                </a:gridCol>
+              </a:tblGrid>
+              <a:tr h="445904">
+                <a:tc>
+                  <a:txBody>
+                    <a:bodyPr/>
+                    <a:lstStyle/>
+                    <a:p>
+                      <a:pPr marL="0" lvl="0" indent="0" algn="l" rtl="0">
+                        <a:spcBef>
+                          <a:spcPts val="0"/>
+                        </a:spcBef>
+                        <a:spcAft>
+                          <a:spcPts val="0"/>
+                        </a:spcAft>
+                        <a:buClr>
+                          <a:schemeClr val="dk1"/>
+                        </a:buClr>
+                        <a:buSzPts val="1100"/>
+                        <a:buFont typeface="Arial"/>
+                        <a:buNone/>
+                      </a:pPr>
+                      <a:r>
+                        <a:rPr lang="en" sz="1100" b="1">
+                          <a:solidFill>
+                            <a:schemeClr val="bg2">
+                              <a:lumMod val="40000"/>
+                              <a:lumOff val="60000"/>
+                            </a:schemeClr>
+                          </a:solidFill>
+                        </a:rPr>
+                        <a:t>(Points)</a:t>
+                      </a:r>
+                      <a:endParaRPr sz="1100" b="1">
+                        <a:solidFill>
+                          <a:schemeClr val="bg2">
+                            <a:lumMod val="40000"/>
+                            <a:lumOff val="60000"/>
+                          </a:schemeClr>
+                        </a:solidFill>
+                      </a:endParaRPr>
+                    </a:p>
+                  </a:txBody>
+                  <a:tcPr marL="45720" marR="45720" marB="0"/>
+                </a:tc>
+                <a:tc>
+                  <a:txBody>
+                    <a:bodyPr/>
+                    <a:lstStyle/>
+                    <a:p>
+                      <a:pPr marL="0" lvl="0" indent="0" algn="l" rtl="0">
+                        <a:spcBef>
+                          <a:spcPts val="0"/>
+                        </a:spcBef>
+                        <a:spcAft>
+                          <a:spcPts val="0"/>
+                        </a:spcAft>
+                        <a:buNone/>
+                      </a:pPr>
+                      <a:r>
+                        <a:rPr lang="en" sz="1100" b="1">
+                          <a:solidFill>
+                            <a:schemeClr val="bg2">
+                              <a:lumMod val="40000"/>
+                              <a:lumOff val="60000"/>
+                            </a:schemeClr>
+                          </a:solidFill>
+                        </a:rPr>
+                        <a:t>0-50%</a:t>
+                      </a:r>
+                      <a:endParaRPr sz="1100" b="1">
+                        <a:solidFill>
+                          <a:schemeClr val="bg2">
+                            <a:lumMod val="40000"/>
+                            <a:lumOff val="60000"/>
+                          </a:schemeClr>
+                        </a:solidFill>
+                      </a:endParaRPr>
+                    </a:p>
+                  </a:txBody>
+                  <a:tcPr marL="45720" marR="45720" marB="0"/>
+                </a:tc>
+                <a:tc>
+                  <a:txBody>
+                    <a:bodyPr/>
+                    <a:lstStyle/>
+                    <a:p>
+                      <a:pPr marL="0" lvl="0" indent="0" algn="l" rtl="0">
+                        <a:spcBef>
+                          <a:spcPts val="0"/>
+                        </a:spcBef>
+                        <a:spcAft>
+                          <a:spcPts val="0"/>
+                        </a:spcAft>
+                        <a:buNone/>
+                      </a:pPr>
+                      <a:r>
+                        <a:rPr lang="en" sz="1100" b="1" dirty="0">
+                          <a:solidFill>
+                            <a:schemeClr val="bg2">
+                              <a:lumMod val="40000"/>
+                              <a:lumOff val="60000"/>
+                            </a:schemeClr>
+                          </a:solidFill>
+                        </a:rPr>
+                        <a:t>50-75%</a:t>
+                      </a:r>
+                      <a:endParaRPr sz="1100" b="1" dirty="0">
+                        <a:solidFill>
+                          <a:schemeClr val="bg2">
+                            <a:lumMod val="40000"/>
+                            <a:lumOff val="60000"/>
+                          </a:schemeClr>
+                        </a:solidFill>
+                      </a:endParaRPr>
+                    </a:p>
+                  </a:txBody>
+                  <a:tcPr marL="45720" marR="45720" marB="0"/>
+                </a:tc>
+                <a:tc>
+                  <a:txBody>
+                    <a:bodyPr/>
+                    <a:lstStyle/>
+                    <a:p>
+                      <a:pPr marL="0" lvl="0" indent="0" algn="l" rtl="0">
+                        <a:spcBef>
+                          <a:spcPts val="0"/>
+                        </a:spcBef>
+                        <a:spcAft>
+                          <a:spcPts val="0"/>
+                        </a:spcAft>
+                        <a:buNone/>
+                      </a:pPr>
+                      <a:r>
+                        <a:rPr lang="en" sz="1100" b="1">
+                          <a:solidFill>
+                            <a:schemeClr val="bg2">
+                              <a:lumMod val="40000"/>
+                              <a:lumOff val="60000"/>
+                            </a:schemeClr>
+                          </a:solidFill>
+                        </a:rPr>
+                        <a:t>75-100%</a:t>
+                      </a:r>
+                      <a:endParaRPr sz="1100" b="1">
+                        <a:solidFill>
+                          <a:schemeClr val="bg2">
+                            <a:lumMod val="40000"/>
+                            <a:lumOff val="60000"/>
+                          </a:schemeClr>
+                        </a:solidFill>
+                      </a:endParaRPr>
+                    </a:p>
+                  </a:txBody>
+                  <a:tcPr marL="45720" marR="45720" marB="0"/>
+                </a:tc>
+                <a:extLst>
+                  <a:ext uri="{0D108BD9-81ED-4DB2-BD59-A6C34878D82A}">
+                    <a16:rowId xmlns:a16="http://schemas.microsoft.com/office/drawing/2014/main" val="10000"/>
+                  </a:ext>
+                </a:extLst>
+              </a:tr>
+              <a:tr h="446447">
+                <a:tc>
+                  <a:txBody>
+                    <a:bodyPr/>
+                    <a:lstStyle/>
+                    <a:p>
+                      <a:pPr marL="0" lvl="0" indent="0" algn="l" rtl="0">
+                        <a:spcBef>
+                          <a:spcPts val="0"/>
+                        </a:spcBef>
+                        <a:spcAft>
+                          <a:spcPts val="0"/>
+                        </a:spcAft>
+                        <a:buNone/>
+                      </a:pPr>
+                      <a:r>
+                        <a:rPr lang="en" sz="900" dirty="0">
+                          <a:solidFill>
+                            <a:schemeClr val="bg2">
+                              <a:lumMod val="40000"/>
+                              <a:lumOff val="60000"/>
+                            </a:schemeClr>
+                          </a:solidFill>
+                        </a:rPr>
+                        <a:t>Problem Description (3)</a:t>
+                      </a:r>
+                      <a:endParaRPr sz="900" dirty="0">
+                        <a:solidFill>
+                          <a:schemeClr val="bg2">
+                            <a:lumMod val="40000"/>
+                            <a:lumOff val="60000"/>
+                          </a:schemeClr>
+                        </a:solidFill>
+                      </a:endParaRPr>
+                    </a:p>
+                  </a:txBody>
+                  <a:tcPr marL="45720" marR="45720" marB="0"/>
+                </a:tc>
+                <a:tc>
+                  <a:txBody>
+                    <a:bodyPr/>
+                    <a:lstStyle/>
+                    <a:p>
+                      <a:pPr marL="0" lvl="0" indent="0" algn="l" rtl="0">
+                        <a:spcBef>
+                          <a:spcPts val="0"/>
+                        </a:spcBef>
+                        <a:spcAft>
+                          <a:spcPts val="0"/>
+                        </a:spcAft>
+                        <a:buNone/>
+                      </a:pPr>
+                      <a:r>
+                        <a:rPr lang="en" sz="1050" dirty="0">
+                          <a:solidFill>
+                            <a:schemeClr val="bg2">
+                              <a:lumMod val="40000"/>
+                              <a:lumOff val="60000"/>
+                            </a:schemeClr>
+                          </a:solidFill>
+                        </a:rPr>
+                        <a:t>Unrelated, simplistic, unmotivating</a:t>
+                      </a:r>
+                      <a:endParaRPr sz="1050" dirty="0">
+                        <a:solidFill>
+                          <a:schemeClr val="bg2">
+                            <a:lumMod val="40000"/>
+                            <a:lumOff val="60000"/>
+                          </a:schemeClr>
+                        </a:solidFill>
+                      </a:endParaRPr>
+                    </a:p>
+                  </a:txBody>
+                  <a:tcPr marL="45720" marR="45720" marB="0"/>
+                </a:tc>
+                <a:tc>
+                  <a:txBody>
+                    <a:bodyPr/>
+                    <a:lstStyle/>
+                    <a:p>
+                      <a:pPr marL="0" lvl="0" indent="0" algn="l" rtl="0">
+                        <a:spcBef>
+                          <a:spcPts val="0"/>
+                        </a:spcBef>
+                        <a:spcAft>
+                          <a:spcPts val="0"/>
+                        </a:spcAft>
+                        <a:buNone/>
+                      </a:pPr>
+                      <a:r>
+                        <a:rPr lang="en" sz="1050" dirty="0">
+                          <a:solidFill>
+                            <a:schemeClr val="bg2">
+                              <a:lumMod val="40000"/>
+                              <a:lumOff val="60000"/>
+                            </a:schemeClr>
+                          </a:solidFill>
+                        </a:rPr>
+                        <a:t>Appropriate, motivated</a:t>
+                      </a:r>
+                      <a:endParaRPr sz="1050" dirty="0">
+                        <a:solidFill>
+                          <a:schemeClr val="bg2">
+                            <a:lumMod val="40000"/>
+                            <a:lumOff val="60000"/>
+                          </a:schemeClr>
+                        </a:solidFill>
+                      </a:endParaRPr>
+                    </a:p>
+                  </a:txBody>
+                  <a:tcPr marL="45720" marR="45720" marB="0"/>
+                </a:tc>
+                <a:tc>
+                  <a:txBody>
+                    <a:bodyPr/>
+                    <a:lstStyle/>
+                    <a:p>
+                      <a:pPr marL="0" lvl="0" indent="0" algn="l" rtl="0">
+                        <a:spcBef>
+                          <a:spcPts val="0"/>
+                        </a:spcBef>
+                        <a:spcAft>
+                          <a:spcPts val="0"/>
+                        </a:spcAft>
+                        <a:buNone/>
+                      </a:pPr>
+                      <a:r>
+                        <a:rPr lang="en" sz="1050" dirty="0">
+                          <a:solidFill>
+                            <a:schemeClr val="bg2">
+                              <a:lumMod val="40000"/>
+                              <a:lumOff val="60000"/>
+                            </a:schemeClr>
+                          </a:solidFill>
+                        </a:rPr>
+                        <a:t>Motivated, interesting, Insightful.</a:t>
+                      </a:r>
+                      <a:endParaRPr sz="1050" dirty="0">
+                        <a:solidFill>
+                          <a:schemeClr val="bg2">
+                            <a:lumMod val="40000"/>
+                            <a:lumOff val="60000"/>
+                          </a:schemeClr>
+                        </a:solidFill>
+                      </a:endParaRPr>
+                    </a:p>
+                  </a:txBody>
+                  <a:tcPr marL="45720" marR="45720" marB="0"/>
+                </a:tc>
+                <a:extLst>
+                  <a:ext uri="{0D108BD9-81ED-4DB2-BD59-A6C34878D82A}">
+                    <a16:rowId xmlns:a16="http://schemas.microsoft.com/office/drawing/2014/main" val="10001"/>
+                  </a:ext>
+                </a:extLst>
+              </a:tr>
+              <a:tr h="690879">
+                <a:tc>
+                  <a:txBody>
+                    <a:bodyPr/>
+                    <a:lstStyle/>
+                    <a:p>
+                      <a:pPr marL="0" lvl="0" indent="0" algn="l" rtl="0">
+                        <a:spcBef>
+                          <a:spcPts val="0"/>
+                        </a:spcBef>
+                        <a:spcAft>
+                          <a:spcPts val="0"/>
+                        </a:spcAft>
+                        <a:buNone/>
+                      </a:pPr>
+                      <a:r>
+                        <a:rPr lang="en" sz="900" dirty="0">
+                          <a:solidFill>
+                            <a:schemeClr val="bg2">
+                              <a:lumMod val="40000"/>
+                              <a:lumOff val="60000"/>
+                            </a:schemeClr>
+                          </a:solidFill>
+                        </a:rPr>
+                        <a:t>Code for Models (15)</a:t>
+                      </a:r>
+                      <a:endParaRPr sz="900" dirty="0">
+                        <a:solidFill>
+                          <a:schemeClr val="bg2">
+                            <a:lumMod val="40000"/>
+                            <a:lumOff val="60000"/>
+                          </a:schemeClr>
+                        </a:solidFill>
+                      </a:endParaRPr>
+                    </a:p>
+                  </a:txBody>
+                  <a:tcPr marL="45720" marR="45720" marB="0"/>
+                </a:tc>
+                <a:tc>
+                  <a:txBody>
+                    <a:bodyPr/>
+                    <a:lstStyle/>
+                    <a:p>
+                      <a:pPr marL="171450" lvl="0" indent="-171450" algn="l" rtl="0">
+                        <a:spcBef>
+                          <a:spcPts val="0"/>
+                        </a:spcBef>
+                        <a:spcAft>
+                          <a:spcPts val="0"/>
+                        </a:spcAft>
+                        <a:buFont typeface="Arial" panose="020B0604020202020204" pitchFamily="34" charset="0"/>
+                        <a:buChar char="•"/>
+                      </a:pPr>
+                      <a:r>
+                        <a:rPr lang="en" sz="1050" dirty="0">
+                          <a:solidFill>
+                            <a:schemeClr val="bg2">
+                              <a:lumMod val="40000"/>
+                              <a:lumOff val="60000"/>
+                            </a:schemeClr>
+                          </a:solidFill>
+                        </a:rPr>
+                        <a:t>Overly simplistic or incomplete. Inappropriate choice of plots; poorly labeled plots; plots missing. </a:t>
+                      </a:r>
+                    </a:p>
+                    <a:p>
+                      <a:pPr marL="171450" lvl="0" indent="-171450" algn="l" rtl="0">
+                        <a:spcBef>
+                          <a:spcPts val="0"/>
+                        </a:spcBef>
+                        <a:spcAft>
+                          <a:spcPts val="0"/>
+                        </a:spcAft>
+                        <a:buFont typeface="Arial" panose="020B0604020202020204" pitchFamily="34" charset="0"/>
+                        <a:buChar char="•"/>
+                      </a:pPr>
+                      <a:r>
+                        <a:rPr lang="en" sz="1050" dirty="0">
+                          <a:solidFill>
+                            <a:schemeClr val="bg2">
+                              <a:lumMod val="40000"/>
+                              <a:lumOff val="60000"/>
+                            </a:schemeClr>
+                          </a:solidFill>
+                        </a:rPr>
+                        <a:t>Data not cleaned at all when needed. </a:t>
+                      </a:r>
+                    </a:p>
+                    <a:p>
+                      <a:pPr marL="171450" lvl="0" indent="-171450" algn="l" rtl="0">
+                        <a:spcBef>
+                          <a:spcPts val="0"/>
+                        </a:spcBef>
+                        <a:spcAft>
+                          <a:spcPts val="0"/>
+                        </a:spcAft>
+                        <a:buFont typeface="Arial" panose="020B0604020202020204" pitchFamily="34" charset="0"/>
+                        <a:buChar char="•"/>
+                      </a:pPr>
+                      <a:r>
+                        <a:rPr lang="en" sz="1050" dirty="0">
+                          <a:solidFill>
+                            <a:schemeClr val="bg2">
+                              <a:lumMod val="40000"/>
+                              <a:lumOff val="60000"/>
+                            </a:schemeClr>
+                          </a:solidFill>
+                        </a:rPr>
+                        <a:t>Model choices is not informative. </a:t>
+                      </a:r>
+                    </a:p>
+                    <a:p>
+                      <a:pPr marL="171450" lvl="0" indent="-171450" algn="l" rtl="0">
+                        <a:spcBef>
+                          <a:spcPts val="0"/>
+                        </a:spcBef>
+                        <a:spcAft>
+                          <a:spcPts val="0"/>
+                        </a:spcAft>
+                        <a:buFont typeface="Arial" panose="020B0604020202020204" pitchFamily="34" charset="0"/>
+                        <a:buChar char="•"/>
+                      </a:pPr>
+                      <a:r>
+                        <a:rPr lang="en" sz="1050" dirty="0">
+                          <a:solidFill>
+                            <a:schemeClr val="bg2">
+                              <a:lumMod val="40000"/>
+                              <a:lumOff val="60000"/>
+                            </a:schemeClr>
+                          </a:solidFill>
+                        </a:rPr>
+                        <a:t>Did not perform Hyperparameter tuning, </a:t>
+                      </a:r>
+                    </a:p>
+                    <a:p>
+                      <a:pPr marL="171450" lvl="0" indent="-171450" algn="l" rtl="0">
+                        <a:spcBef>
+                          <a:spcPts val="0"/>
+                        </a:spcBef>
+                        <a:spcAft>
+                          <a:spcPts val="0"/>
+                        </a:spcAft>
+                        <a:buFont typeface="Arial" panose="020B0604020202020204" pitchFamily="34" charset="0"/>
+                        <a:buChar char="•"/>
+                      </a:pPr>
+                      <a:r>
+                        <a:rPr lang="en" sz="1050" dirty="0">
+                          <a:solidFill>
+                            <a:schemeClr val="bg2">
+                              <a:lumMod val="40000"/>
+                              <a:lumOff val="60000"/>
+                            </a:schemeClr>
+                          </a:solidFill>
+                        </a:rPr>
+                        <a:t>Performance measurement, non-descriptive choice of various parameters.</a:t>
+                      </a:r>
+                      <a:endParaRPr sz="1050" dirty="0">
+                        <a:solidFill>
+                          <a:schemeClr val="bg2">
+                            <a:lumMod val="40000"/>
+                            <a:lumOff val="60000"/>
+                          </a:schemeClr>
+                        </a:solidFill>
+                      </a:endParaRPr>
+                    </a:p>
+                  </a:txBody>
+                  <a:tcPr marL="45720" marR="45720" marB="0"/>
+                </a:tc>
+                <a:tc>
+                  <a:txBody>
+                    <a:bodyPr/>
+                    <a:lstStyle/>
+                    <a:p>
+                      <a:pPr marL="171450" lvl="0" indent="-171450" algn="l" rtl="0">
+                        <a:spcBef>
+                          <a:spcPts val="0"/>
+                        </a:spcBef>
+                        <a:spcAft>
+                          <a:spcPts val="0"/>
+                        </a:spcAft>
+                        <a:buFont typeface="Arial" panose="020B0604020202020204" pitchFamily="34" charset="0"/>
+                        <a:buChar char="•"/>
+                      </a:pPr>
+                      <a:r>
+                        <a:rPr lang="en" sz="1050" dirty="0">
+                          <a:solidFill>
+                            <a:schemeClr val="bg2">
+                              <a:lumMod val="40000"/>
+                              <a:lumOff val="60000"/>
+                            </a:schemeClr>
+                          </a:solidFill>
+                        </a:rPr>
+                        <a:t>Analysis appropriate. Plots convey information but lack context for interpretation. </a:t>
+                      </a:r>
+                    </a:p>
+                    <a:p>
+                      <a:pPr marL="171450" lvl="0" indent="-171450" algn="l" rtl="0">
+                        <a:spcBef>
+                          <a:spcPts val="0"/>
+                        </a:spcBef>
+                        <a:spcAft>
+                          <a:spcPts val="0"/>
+                        </a:spcAft>
+                        <a:buFont typeface="Arial" panose="020B0604020202020204" pitchFamily="34" charset="0"/>
+                        <a:buChar char="•"/>
+                      </a:pPr>
+                      <a:r>
+                        <a:rPr lang="en" sz="1050" dirty="0">
+                          <a:solidFill>
+                            <a:schemeClr val="bg2">
+                              <a:lumMod val="40000"/>
+                              <a:lumOff val="60000"/>
+                            </a:schemeClr>
+                          </a:solidFill>
+                        </a:rPr>
+                        <a:t>Some Data cleaned when needed. </a:t>
+                      </a:r>
+                    </a:p>
+                    <a:p>
+                      <a:pPr marL="171450" lvl="0" indent="-171450" algn="l" rtl="0">
+                        <a:spcBef>
+                          <a:spcPts val="0"/>
+                        </a:spcBef>
+                        <a:spcAft>
+                          <a:spcPts val="0"/>
+                        </a:spcAft>
+                        <a:buFont typeface="Arial" panose="020B0604020202020204" pitchFamily="34" charset="0"/>
+                        <a:buChar char="•"/>
+                      </a:pPr>
+                      <a:r>
+                        <a:rPr lang="en" sz="1050" dirty="0">
+                          <a:solidFill>
+                            <a:schemeClr val="bg2">
+                              <a:lumMod val="40000"/>
+                              <a:lumOff val="60000"/>
+                            </a:schemeClr>
+                          </a:solidFill>
+                        </a:rPr>
+                        <a:t>Models work but choice somewhat informative. </a:t>
+                      </a:r>
+                    </a:p>
+                    <a:p>
+                      <a:pPr marL="171450" lvl="0" indent="-171450" algn="l" rtl="0">
+                        <a:spcBef>
+                          <a:spcPts val="0"/>
+                        </a:spcBef>
+                        <a:spcAft>
+                          <a:spcPts val="0"/>
+                        </a:spcAft>
+                        <a:buFont typeface="Arial" panose="020B0604020202020204" pitchFamily="34" charset="0"/>
+                        <a:buChar char="•"/>
+                      </a:pPr>
+                      <a:r>
+                        <a:rPr lang="en" sz="1050" dirty="0">
+                          <a:solidFill>
+                            <a:schemeClr val="bg2">
+                              <a:lumMod val="40000"/>
+                              <a:lumOff val="60000"/>
+                            </a:schemeClr>
+                          </a:solidFill>
+                        </a:rPr>
+                        <a:t>Hyperparameter optimization done using functions without any intuition/logic. </a:t>
+                      </a:r>
+                    </a:p>
+                    <a:p>
+                      <a:pPr marL="171450" lvl="0" indent="-171450" algn="l" rtl="0">
+                        <a:spcBef>
+                          <a:spcPts val="0"/>
+                        </a:spcBef>
+                        <a:spcAft>
+                          <a:spcPts val="0"/>
+                        </a:spcAft>
+                        <a:buFont typeface="Arial" panose="020B0604020202020204" pitchFamily="34" charset="0"/>
+                        <a:buChar char="•"/>
+                      </a:pPr>
+                      <a:r>
+                        <a:rPr lang="en" sz="1050" dirty="0">
+                          <a:solidFill>
+                            <a:schemeClr val="bg2">
+                              <a:lumMod val="40000"/>
+                              <a:lumOff val="60000"/>
+                            </a:schemeClr>
+                          </a:solidFill>
+                        </a:rPr>
+                        <a:t>Some performance measurement, some descriptive choice of various parameters.</a:t>
+                      </a:r>
+                      <a:endParaRPr sz="1050" dirty="0">
+                        <a:solidFill>
+                          <a:schemeClr val="bg2">
+                            <a:lumMod val="40000"/>
+                            <a:lumOff val="60000"/>
+                          </a:schemeClr>
+                        </a:solidFill>
+                      </a:endParaRPr>
+                    </a:p>
+                  </a:txBody>
+                  <a:tcPr marL="45720" marR="45720" marB="0"/>
+                </a:tc>
+                <a:tc>
+                  <a:txBody>
+                    <a:bodyPr/>
+                    <a:lstStyle/>
+                    <a:p>
+                      <a:pPr marL="171450" lvl="0" indent="-171450" algn="l" rtl="0">
+                        <a:spcBef>
+                          <a:spcPts val="0"/>
+                        </a:spcBef>
+                        <a:spcAft>
+                          <a:spcPts val="0"/>
+                        </a:spcAft>
+                        <a:buFont typeface="Arial" panose="020B0604020202020204" pitchFamily="34" charset="0"/>
+                        <a:buChar char="•"/>
+                      </a:pPr>
+                      <a:r>
+                        <a:rPr lang="en" sz="1050" dirty="0">
+                          <a:solidFill>
+                            <a:schemeClr val="bg2">
+                              <a:lumMod val="40000"/>
+                              <a:lumOff val="60000"/>
+                            </a:schemeClr>
+                          </a:solidFill>
+                        </a:rPr>
+                        <a:t>Appropriate, Complete, Advanced, and Informative. Plots convey information correctly with adequate and appropriate reference information. </a:t>
+                      </a:r>
+                    </a:p>
+                    <a:p>
+                      <a:pPr marL="171450" lvl="0" indent="-171450" algn="l" rtl="0">
+                        <a:spcBef>
+                          <a:spcPts val="0"/>
+                        </a:spcBef>
+                        <a:spcAft>
+                          <a:spcPts val="0"/>
+                        </a:spcAft>
+                        <a:buFont typeface="Arial" panose="020B0604020202020204" pitchFamily="34" charset="0"/>
+                        <a:buChar char="•"/>
+                      </a:pPr>
+                      <a:r>
+                        <a:rPr lang="en" sz="1050" dirty="0">
+                          <a:solidFill>
+                            <a:schemeClr val="bg2">
+                              <a:lumMod val="40000"/>
+                              <a:lumOff val="60000"/>
+                            </a:schemeClr>
+                          </a:solidFill>
+                        </a:rPr>
+                        <a:t>Every step starting from data description to optimization of parameters, error minimization, distance measures etc.,  choice of models, explained clearly. </a:t>
+                      </a:r>
+                    </a:p>
+                    <a:p>
+                      <a:pPr marL="171450" lvl="0" indent="-171450" algn="l" rtl="0">
+                        <a:spcBef>
+                          <a:spcPts val="0"/>
+                        </a:spcBef>
+                        <a:spcAft>
+                          <a:spcPts val="0"/>
+                        </a:spcAft>
+                        <a:buFont typeface="Arial" panose="020B0604020202020204" pitchFamily="34" charset="0"/>
+                        <a:buChar char="•"/>
+                      </a:pPr>
+                      <a:r>
+                        <a:rPr lang="en" sz="1050" dirty="0">
+                          <a:solidFill>
+                            <a:schemeClr val="bg2">
+                              <a:lumMod val="40000"/>
+                              <a:lumOff val="60000"/>
+                            </a:schemeClr>
+                          </a:solidFill>
+                        </a:rPr>
+                        <a:t>Works seamlessly.</a:t>
+                      </a:r>
+                      <a:endParaRPr sz="1050" dirty="0">
+                        <a:solidFill>
+                          <a:schemeClr val="bg2">
+                            <a:lumMod val="40000"/>
+                            <a:lumOff val="60000"/>
+                          </a:schemeClr>
+                        </a:solidFill>
+                      </a:endParaRPr>
+                    </a:p>
+                  </a:txBody>
+                  <a:tcPr marL="45720" marR="45720" marB="0"/>
+                </a:tc>
+                <a:extLst>
+                  <a:ext uri="{0D108BD9-81ED-4DB2-BD59-A6C34878D82A}">
+                    <a16:rowId xmlns:a16="http://schemas.microsoft.com/office/drawing/2014/main" val="10002"/>
+                  </a:ext>
+                </a:extLst>
+              </a:tr>
+              <a:tr h="485790">
+                <a:tc>
+                  <a:txBody>
+                    <a:bodyPr/>
+                    <a:lstStyle/>
+                    <a:p>
+                      <a:pPr marL="0" lvl="0" indent="0" algn="l" rtl="0">
+                        <a:spcBef>
+                          <a:spcPts val="0"/>
+                        </a:spcBef>
+                        <a:spcAft>
+                          <a:spcPts val="0"/>
+                        </a:spcAft>
+                        <a:buNone/>
+                      </a:pPr>
+                      <a:r>
+                        <a:rPr lang="en" sz="900" dirty="0">
+                          <a:solidFill>
+                            <a:schemeClr val="bg2">
+                              <a:lumMod val="40000"/>
+                              <a:lumOff val="60000"/>
+                            </a:schemeClr>
+                          </a:solidFill>
+                        </a:rPr>
+                        <a:t>Results (5)</a:t>
+                      </a:r>
+                      <a:endParaRPr sz="900" dirty="0">
+                        <a:solidFill>
+                          <a:schemeClr val="bg2">
+                            <a:lumMod val="40000"/>
+                            <a:lumOff val="60000"/>
+                          </a:schemeClr>
+                        </a:solidFill>
+                      </a:endParaRPr>
+                    </a:p>
+                  </a:txBody>
+                  <a:tcPr marL="45720" marR="45720" marB="0"/>
+                </a:tc>
+                <a:tc>
+                  <a:txBody>
+                    <a:bodyPr/>
+                    <a:lstStyle/>
+                    <a:p>
+                      <a:pPr marL="0" lvl="0" indent="0" algn="l" rtl="0">
+                        <a:lnSpc>
+                          <a:spcPct val="115000"/>
+                        </a:lnSpc>
+                        <a:spcBef>
+                          <a:spcPts val="0"/>
+                        </a:spcBef>
+                        <a:spcAft>
+                          <a:spcPts val="1600"/>
+                        </a:spcAft>
+                        <a:buNone/>
+                      </a:pPr>
+                      <a:r>
+                        <a:rPr lang="en" sz="1050" dirty="0">
+                          <a:solidFill>
+                            <a:schemeClr val="bg2">
+                              <a:lumMod val="40000"/>
+                              <a:lumOff val="60000"/>
+                            </a:schemeClr>
+                          </a:solidFill>
+                        </a:rPr>
+                        <a:t>Written Description. Conclusions are missing, incorrect, or not based on analysis. </a:t>
+                      </a:r>
+                      <a:endParaRPr sz="1050" dirty="0">
+                        <a:solidFill>
+                          <a:schemeClr val="bg2">
+                            <a:lumMod val="40000"/>
+                            <a:lumOff val="60000"/>
+                          </a:schemeClr>
+                        </a:solidFill>
+                      </a:endParaRPr>
+                    </a:p>
+                  </a:txBody>
+                  <a:tcPr marL="45720" marR="45720" marB="0"/>
+                </a:tc>
+                <a:tc>
+                  <a:txBody>
+                    <a:bodyPr/>
+                    <a:lstStyle/>
+                    <a:p>
+                      <a:pPr marL="0" lvl="0" indent="0" algn="l" rtl="0">
+                        <a:spcBef>
+                          <a:spcPts val="0"/>
+                        </a:spcBef>
+                        <a:spcAft>
+                          <a:spcPts val="0"/>
+                        </a:spcAft>
+                        <a:buNone/>
+                      </a:pPr>
+                      <a:r>
+                        <a:rPr lang="en" sz="1050" dirty="0">
+                          <a:solidFill>
+                            <a:schemeClr val="bg2">
+                              <a:lumMod val="40000"/>
+                              <a:lumOff val="60000"/>
+                            </a:schemeClr>
+                          </a:solidFill>
+                        </a:rPr>
+                        <a:t>Written Description. Conclusions relevant, but partially correct or partially complete. </a:t>
+                      </a:r>
+                      <a:endParaRPr sz="1050" dirty="0">
+                        <a:solidFill>
+                          <a:schemeClr val="bg2">
+                            <a:lumMod val="40000"/>
+                            <a:lumOff val="60000"/>
+                          </a:schemeClr>
+                        </a:solidFill>
+                      </a:endParaRPr>
+                    </a:p>
+                  </a:txBody>
+                  <a:tcPr marL="45720" marR="45720" marB="0"/>
+                </a:tc>
+                <a:tc>
+                  <a:txBody>
+                    <a:bodyPr/>
+                    <a:lstStyle/>
+                    <a:p>
+                      <a:pPr marL="0" lvl="0" indent="0" algn="l" rtl="0">
+                        <a:spcBef>
+                          <a:spcPts val="0"/>
+                        </a:spcBef>
+                        <a:spcAft>
+                          <a:spcPts val="0"/>
+                        </a:spcAft>
+                        <a:buNone/>
+                      </a:pPr>
+                      <a:r>
+                        <a:rPr lang="en" sz="1050" dirty="0">
+                          <a:solidFill>
+                            <a:schemeClr val="bg2">
+                              <a:lumMod val="40000"/>
+                              <a:lumOff val="60000"/>
+                            </a:schemeClr>
+                          </a:solidFill>
+                        </a:rPr>
+                        <a:t>Written Description. Relevant conclusions explicitly tied to analysis and to context. </a:t>
+                      </a:r>
+                      <a:endParaRPr sz="1050" dirty="0">
+                        <a:solidFill>
+                          <a:schemeClr val="bg2">
+                            <a:lumMod val="40000"/>
+                            <a:lumOff val="60000"/>
+                          </a:schemeClr>
+                        </a:solidFill>
+                      </a:endParaRPr>
+                    </a:p>
+                  </a:txBody>
+                  <a:tcPr marL="45720" marR="45720" marB="0"/>
+                </a:tc>
+                <a:extLst>
+                  <a:ext uri="{0D108BD9-81ED-4DB2-BD59-A6C34878D82A}">
+                    <a16:rowId xmlns:a16="http://schemas.microsoft.com/office/drawing/2014/main" val="10003"/>
+                  </a:ext>
+                </a:extLst>
+              </a:tr>
+              <a:tr h="1123950">
+                <a:tc>
+                  <a:txBody>
+                    <a:bodyPr/>
+                    <a:lstStyle/>
+                    <a:p>
+                      <a:pPr marL="0" lvl="0" indent="0" algn="l" rtl="0">
+                        <a:spcBef>
+                          <a:spcPts val="0"/>
+                        </a:spcBef>
+                        <a:spcAft>
+                          <a:spcPts val="0"/>
+                        </a:spcAft>
+                        <a:buNone/>
+                      </a:pPr>
+                      <a:r>
+                        <a:rPr lang="en" sz="900" dirty="0">
+                          <a:solidFill>
+                            <a:schemeClr val="bg2">
+                              <a:lumMod val="40000"/>
+                              <a:lumOff val="60000"/>
+                            </a:schemeClr>
+                          </a:solidFill>
+                        </a:rPr>
+                        <a:t>Readability (5)</a:t>
+                      </a:r>
+                      <a:endParaRPr sz="900" dirty="0">
+                        <a:solidFill>
+                          <a:schemeClr val="bg2">
+                            <a:lumMod val="40000"/>
+                            <a:lumOff val="60000"/>
+                          </a:schemeClr>
+                        </a:solidFill>
+                      </a:endParaRPr>
+                    </a:p>
+                  </a:txBody>
+                  <a:tcPr marL="45720" marR="45720" marB="0"/>
+                </a:tc>
+                <a:tc>
+                  <a:txBody>
+                    <a:bodyPr/>
+                    <a:lstStyle/>
+                    <a:p>
+                      <a:pPr marL="0" lvl="0" indent="0" algn="l" rtl="0">
+                        <a:spcBef>
+                          <a:spcPts val="0"/>
+                        </a:spcBef>
+                        <a:spcAft>
+                          <a:spcPts val="0"/>
+                        </a:spcAft>
+                        <a:buNone/>
+                      </a:pPr>
+                      <a:r>
+                        <a:rPr lang="en" sz="1050" dirty="0">
+                          <a:solidFill>
+                            <a:schemeClr val="bg2">
+                              <a:lumMod val="40000"/>
+                              <a:lumOff val="60000"/>
+                            </a:schemeClr>
+                          </a:solidFill>
+                        </a:rPr>
+                        <a:t>Code is messy and poorly organized; </a:t>
+                      </a:r>
+                    </a:p>
+                    <a:p>
+                      <a:pPr marL="0" lvl="0" indent="0" algn="l" rtl="0">
+                        <a:spcBef>
+                          <a:spcPts val="0"/>
+                        </a:spcBef>
+                        <a:spcAft>
+                          <a:spcPts val="0"/>
+                        </a:spcAft>
+                        <a:buNone/>
+                      </a:pPr>
+                      <a:r>
+                        <a:rPr lang="en" sz="1050" dirty="0">
+                          <a:solidFill>
+                            <a:schemeClr val="bg2">
+                              <a:lumMod val="40000"/>
+                              <a:lumOff val="60000"/>
+                            </a:schemeClr>
+                          </a:solidFill>
+                        </a:rPr>
+                        <a:t>No comments added; </a:t>
+                      </a:r>
+                    </a:p>
+                    <a:p>
+                      <a:pPr marL="0" lvl="0" indent="0" algn="l" rtl="0">
+                        <a:spcBef>
+                          <a:spcPts val="0"/>
+                        </a:spcBef>
+                        <a:spcAft>
+                          <a:spcPts val="0"/>
+                        </a:spcAft>
+                        <a:buNone/>
+                      </a:pPr>
+                      <a:r>
+                        <a:rPr lang="en" sz="1050" dirty="0">
+                          <a:solidFill>
+                            <a:schemeClr val="bg2">
+                              <a:lumMod val="40000"/>
+                              <a:lumOff val="60000"/>
+                            </a:schemeClr>
+                          </a:solidFill>
+                        </a:rPr>
+                        <a:t>unused or irrelevant code distracts when reading code.</a:t>
+                      </a:r>
+                    </a:p>
+                    <a:p>
+                      <a:pPr marL="0" lvl="0" indent="0" algn="l" rtl="0">
+                        <a:spcBef>
+                          <a:spcPts val="0"/>
+                        </a:spcBef>
+                        <a:spcAft>
+                          <a:spcPts val="0"/>
+                        </a:spcAft>
+                        <a:buNone/>
+                      </a:pPr>
+                      <a:r>
+                        <a:rPr lang="en" sz="1050" dirty="0">
+                          <a:solidFill>
+                            <a:schemeClr val="bg2">
+                              <a:lumMod val="40000"/>
+                              <a:lumOff val="60000"/>
+                            </a:schemeClr>
+                          </a:solidFill>
+                        </a:rPr>
+                        <a:t>Variables and functions names are not helpful to understand code.</a:t>
+                      </a:r>
+                      <a:endParaRPr sz="1050" dirty="0">
+                        <a:solidFill>
+                          <a:schemeClr val="bg2">
+                            <a:lumMod val="40000"/>
+                            <a:lumOff val="60000"/>
+                          </a:schemeClr>
+                        </a:solidFill>
+                      </a:endParaRPr>
+                    </a:p>
+                  </a:txBody>
+                  <a:tcPr marL="45720" marR="45720" marB="0"/>
+                </a:tc>
+                <a:tc>
+                  <a:txBody>
+                    <a:bodyPr/>
+                    <a:lstStyle/>
+                    <a:p>
+                      <a:pPr marL="0" lvl="0" indent="0" algn="l" rtl="0">
+                        <a:spcBef>
+                          <a:spcPts val="0"/>
+                        </a:spcBef>
+                        <a:spcAft>
+                          <a:spcPts val="0"/>
+                        </a:spcAft>
+                        <a:buNone/>
+                      </a:pPr>
+                      <a:r>
+                        <a:rPr lang="en" sz="1050" dirty="0">
+                          <a:solidFill>
+                            <a:schemeClr val="bg2">
+                              <a:lumMod val="40000"/>
+                              <a:lumOff val="60000"/>
+                            </a:schemeClr>
+                          </a:solidFill>
+                        </a:rPr>
+                        <a:t>Code is reasonably well organized.  </a:t>
+                      </a:r>
+                    </a:p>
+                    <a:p>
+                      <a:pPr marL="0" lvl="0" indent="0" algn="l" rtl="0">
+                        <a:spcBef>
+                          <a:spcPts val="0"/>
+                        </a:spcBef>
+                        <a:spcAft>
+                          <a:spcPts val="0"/>
+                        </a:spcAft>
+                        <a:buNone/>
+                      </a:pPr>
+                      <a:r>
+                        <a:rPr lang="en" sz="1050" dirty="0">
+                          <a:solidFill>
+                            <a:schemeClr val="bg2">
+                              <a:lumMod val="40000"/>
+                              <a:lumOff val="60000"/>
+                            </a:schemeClr>
+                          </a:solidFill>
+                        </a:rPr>
+                        <a:t>There is little unused or irrelevant code, or this code has been moved out of the main project files. </a:t>
+                      </a:r>
+                    </a:p>
+                    <a:p>
+                      <a:pPr marL="0" lvl="0" indent="0" algn="l" rtl="0">
+                        <a:spcBef>
+                          <a:spcPts val="0"/>
+                        </a:spcBef>
+                        <a:spcAft>
+                          <a:spcPts val="0"/>
+                        </a:spcAft>
+                        <a:buNone/>
+                      </a:pPr>
+                      <a:r>
+                        <a:rPr lang="en" sz="1050" dirty="0">
+                          <a:solidFill>
+                            <a:schemeClr val="bg2">
+                              <a:lumMod val="40000"/>
+                              <a:lumOff val="60000"/>
+                            </a:schemeClr>
+                          </a:solidFill>
+                        </a:rPr>
+                        <a:t>Variable and function names generally meaningful and helpful for understanding.</a:t>
+                      </a:r>
+                      <a:endParaRPr sz="1050" dirty="0">
+                        <a:solidFill>
+                          <a:schemeClr val="bg2">
+                            <a:lumMod val="40000"/>
+                            <a:lumOff val="60000"/>
+                          </a:schemeClr>
+                        </a:solidFill>
+                      </a:endParaRPr>
+                    </a:p>
+                  </a:txBody>
+                  <a:tcPr marL="45720" marR="45720" marB="0"/>
+                </a:tc>
+                <a:tc>
+                  <a:txBody>
+                    <a:bodyPr/>
+                    <a:lstStyle/>
+                    <a:p>
+                      <a:pPr marL="0" lvl="0" indent="0" algn="l" rtl="0">
+                        <a:spcBef>
+                          <a:spcPts val="0"/>
+                        </a:spcBef>
+                        <a:spcAft>
+                          <a:spcPts val="0"/>
+                        </a:spcAft>
+                        <a:buNone/>
+                      </a:pPr>
+                      <a:r>
+                        <a:rPr lang="en" sz="1050" dirty="0">
+                          <a:solidFill>
+                            <a:schemeClr val="bg2">
+                              <a:lumMod val="40000"/>
+                              <a:lumOff val="60000"/>
+                            </a:schemeClr>
+                          </a:solidFill>
+                        </a:rPr>
+                        <a:t>Code very well organized.  </a:t>
+                      </a:r>
+                    </a:p>
+                    <a:p>
+                      <a:pPr marL="0" lvl="0" indent="0" algn="l" rtl="0">
+                        <a:spcBef>
+                          <a:spcPts val="0"/>
+                        </a:spcBef>
+                        <a:spcAft>
+                          <a:spcPts val="0"/>
+                        </a:spcAft>
+                        <a:buNone/>
+                      </a:pPr>
+                      <a:r>
+                        <a:rPr lang="en" sz="1050" dirty="0">
+                          <a:solidFill>
+                            <a:schemeClr val="bg2">
+                              <a:lumMod val="40000"/>
+                              <a:lumOff val="60000"/>
+                            </a:schemeClr>
+                          </a:solidFill>
+                        </a:rPr>
+                        <a:t>No irrelevant or distracting code. </a:t>
+                      </a:r>
+                    </a:p>
+                    <a:p>
+                      <a:pPr marL="0" lvl="0" indent="0" algn="l" rtl="0">
+                        <a:spcBef>
+                          <a:spcPts val="0"/>
+                        </a:spcBef>
+                        <a:spcAft>
+                          <a:spcPts val="0"/>
+                        </a:spcAft>
+                        <a:buNone/>
+                      </a:pPr>
+                      <a:r>
+                        <a:rPr lang="en" sz="1050" dirty="0">
+                          <a:solidFill>
+                            <a:schemeClr val="bg2">
+                              <a:lumMod val="40000"/>
+                              <a:lumOff val="60000"/>
+                            </a:schemeClr>
+                          </a:solidFill>
+                        </a:rPr>
+                        <a:t>Variable and function names have clear relationship to their purpose in the code. </a:t>
+                      </a:r>
+                    </a:p>
+                    <a:p>
+                      <a:pPr marL="0" lvl="0" indent="0" algn="l" rtl="0">
+                        <a:spcBef>
+                          <a:spcPts val="0"/>
+                        </a:spcBef>
+                        <a:spcAft>
+                          <a:spcPts val="0"/>
+                        </a:spcAft>
+                        <a:buNone/>
+                      </a:pPr>
+                      <a:r>
+                        <a:rPr lang="en" sz="1050" dirty="0">
+                          <a:solidFill>
+                            <a:schemeClr val="bg2">
+                              <a:lumMod val="40000"/>
+                              <a:lumOff val="60000"/>
+                            </a:schemeClr>
+                          </a:solidFill>
+                        </a:rPr>
+                        <a:t>Code is easy to read and understand.</a:t>
+                      </a:r>
+                      <a:endParaRPr sz="1050" dirty="0">
+                        <a:solidFill>
+                          <a:schemeClr val="bg2">
+                            <a:lumMod val="40000"/>
+                            <a:lumOff val="60000"/>
+                          </a:schemeClr>
+                        </a:solidFill>
+                      </a:endParaRPr>
+                    </a:p>
+                  </a:txBody>
+                  <a:tcPr marL="45720" marR="45720" marB="0"/>
+                </a:tc>
+                <a:extLst>
+                  <a:ext uri="{0D108BD9-81ED-4DB2-BD59-A6C34878D82A}">
+                    <a16:rowId xmlns:a16="http://schemas.microsoft.com/office/drawing/2014/main" val="10005"/>
+                  </a:ext>
+                </a:extLst>
+              </a:tr>
+              <a:tr h="690879">
+                <a:tc>
+                  <a:txBody>
+                    <a:bodyPr/>
+                    <a:lstStyle/>
+                    <a:p>
+                      <a:pPr marL="0" lvl="0" indent="0" algn="l" rtl="0">
+                        <a:spcBef>
+                          <a:spcPts val="0"/>
+                        </a:spcBef>
+                        <a:spcAft>
+                          <a:spcPts val="0"/>
+                        </a:spcAft>
+                        <a:buNone/>
+                      </a:pPr>
+                      <a:r>
+                        <a:rPr lang="en" sz="900" dirty="0">
+                          <a:solidFill>
+                            <a:schemeClr val="bg2">
+                              <a:lumMod val="40000"/>
+                              <a:lumOff val="60000"/>
+                            </a:schemeClr>
+                          </a:solidFill>
+                        </a:rPr>
+                        <a:t>Reproducibility (2)</a:t>
+                      </a:r>
+                      <a:endParaRPr sz="900" dirty="0">
+                        <a:solidFill>
+                          <a:schemeClr val="bg2">
+                            <a:lumMod val="40000"/>
+                            <a:lumOff val="60000"/>
+                          </a:schemeClr>
+                        </a:solidFill>
+                      </a:endParaRPr>
+                    </a:p>
+                  </a:txBody>
+                  <a:tcPr marL="45720" marR="45720" marB="0"/>
+                </a:tc>
+                <a:tc>
+                  <a:txBody>
+                    <a:bodyPr/>
+                    <a:lstStyle/>
+                    <a:p>
+                      <a:pPr marL="0" lvl="0" indent="0" algn="l" rtl="0">
+                        <a:spcBef>
+                          <a:spcPts val="0"/>
+                        </a:spcBef>
+                        <a:spcAft>
+                          <a:spcPts val="0"/>
+                        </a:spcAft>
+                        <a:buNone/>
+                      </a:pPr>
+                      <a:r>
+                        <a:rPr lang="en" sz="1050" dirty="0">
+                          <a:solidFill>
+                            <a:schemeClr val="bg2">
+                              <a:lumMod val="40000"/>
+                              <a:lumOff val="60000"/>
+                            </a:schemeClr>
+                          </a:solidFill>
+                        </a:rPr>
+                        <a:t>No Readme.</a:t>
+                      </a:r>
+                      <a:endParaRPr sz="1050" dirty="0">
+                        <a:solidFill>
+                          <a:schemeClr val="bg2">
+                            <a:lumMod val="40000"/>
+                            <a:lumOff val="60000"/>
+                          </a:schemeClr>
+                        </a:solidFill>
+                      </a:endParaRPr>
+                    </a:p>
+                  </a:txBody>
+                  <a:tcPr marL="45720" marR="45720" marB="0"/>
+                </a:tc>
+                <a:tc>
+                  <a:txBody>
+                    <a:bodyPr/>
+                    <a:lstStyle/>
+                    <a:p>
+                      <a:pPr marL="0" lvl="0" indent="0" algn="l" rtl="0">
+                        <a:spcBef>
+                          <a:spcPts val="0"/>
+                        </a:spcBef>
+                        <a:spcAft>
+                          <a:spcPts val="0"/>
+                        </a:spcAft>
+                        <a:buNone/>
+                      </a:pPr>
+                      <a:r>
+                        <a:rPr lang="en-US" sz="1050" dirty="0">
+                          <a:solidFill>
+                            <a:schemeClr val="bg2">
+                              <a:lumMod val="40000"/>
+                              <a:lumOff val="60000"/>
+                            </a:schemeClr>
+                          </a:solidFill>
+                        </a:rPr>
+                        <a:t>-</a:t>
+                      </a:r>
+                      <a:endParaRPr sz="1050" dirty="0">
+                        <a:solidFill>
+                          <a:schemeClr val="bg2">
+                            <a:lumMod val="40000"/>
+                            <a:lumOff val="60000"/>
+                          </a:schemeClr>
+                        </a:solidFill>
+                      </a:endParaRPr>
+                    </a:p>
+                  </a:txBody>
+                  <a:tcPr marL="45720" marR="45720" marB="0"/>
+                </a:tc>
+                <a:tc>
+                  <a:txBody>
+                    <a:bodyPr/>
+                    <a:lstStyle/>
+                    <a:p>
+                      <a:pPr marL="0" lvl="0" indent="0" algn="l" rtl="0">
+                        <a:spcBef>
+                          <a:spcPts val="0"/>
+                        </a:spcBef>
+                        <a:spcAft>
+                          <a:spcPts val="0"/>
+                        </a:spcAft>
+                        <a:buClr>
+                          <a:schemeClr val="dk1"/>
+                        </a:buClr>
+                        <a:buSzPts val="1100"/>
+                        <a:buFont typeface="Arial"/>
+                        <a:buNone/>
+                      </a:pPr>
+                      <a:r>
+                        <a:rPr lang="en" sz="1050" dirty="0">
+                          <a:solidFill>
+                            <a:schemeClr val="bg2">
+                              <a:lumMod val="40000"/>
+                              <a:lumOff val="60000"/>
+                            </a:schemeClr>
+                          </a:solidFill>
+                        </a:rPr>
+                        <a:t>Readme well documented. Steps to run the code and any explanation needed is clearly written.</a:t>
+                      </a:r>
+                      <a:endParaRPr sz="1050" dirty="0">
+                        <a:solidFill>
+                          <a:schemeClr val="bg2">
+                            <a:lumMod val="40000"/>
+                            <a:lumOff val="60000"/>
+                          </a:schemeClr>
+                        </a:solidFill>
+                      </a:endParaRPr>
+                    </a:p>
+                  </a:txBody>
+                  <a:tcPr marL="45720" marR="45720" marB="0"/>
+                </a:tc>
+                <a:extLst>
+                  <a:ext uri="{0D108BD9-81ED-4DB2-BD59-A6C34878D82A}">
+                    <a16:rowId xmlns:a16="http://schemas.microsoft.com/office/drawing/2014/main" val="10006"/>
+                  </a:ext>
+                </a:extLst>
+              </a:tr>
+            </a:tbl>
+          </a:graphicData>
+        </a:graphic>
+      </p:graphicFrame>
+      <p:sp>
+        <p:nvSpPr>
+          <p:cNvPr id="2" name="Process 1">
+            <a:extLst>
+              <a:ext uri="{FF2B5EF4-FFF2-40B4-BE49-F238E27FC236}">
+                <a16:creationId xmlns:a16="http://schemas.microsoft.com/office/drawing/2014/main" id="{C77824A2-3EFD-D734-546E-E1D41A1660D2}"/>
+              </a:ext>
+            </a:extLst>
+          </p:cNvPr>
+          <p:cNvSpPr/>
+          <p:nvPr/>
+        </p:nvSpPr>
+        <p:spPr>
+          <a:xfrm>
+            <a:off x="2225615" y="1477992"/>
+            <a:ext cx="5457645" cy="2771955"/>
+          </a:xfrm>
+          <a:prstGeom prst="flowChartProcess">
+            <a:avLst/>
+          </a:prstGeom>
+          <a:solidFill>
+            <a:srgbClr val="C00000"/>
+          </a:solidFill>
+          <a:ln>
+            <a:noFill/>
+          </a:ln>
+        </p:spPr>
+        <p:style>
+          <a:lnRef idx="0">
+            <a:scrgbClr r="0" g="0" b="0"/>
+          </a:lnRef>
+          <a:fillRef idx="0">
+            <a:scrgbClr r="0" g="0" b="0"/>
+          </a:fillRef>
+          <a:effectRef idx="0">
+            <a:scrgbClr r="0" g="0" b="0"/>
+          </a:effectRef>
+          <a:fontRef idx="minor">
+            <a:schemeClr val="lt1"/>
+          </a:fontRef>
+        </p:style>
+        <p:txBody>
+          <a:bodyPr rtlCol="0" anchor="ctr"/>
+          <a:lstStyle/>
+          <a:p>
+            <a:pPr algn="ctr"/>
+            <a:r>
+              <a:rPr lang="en-US" dirty="0"/>
+              <a:t>If code does not run, 0 score will be for coding section.</a:t>
+            </a:r>
+          </a:p>
+        </p:txBody>
+      </p:sp>
+    </p:spTree>
+    <p:extLst>
+      <p:ext uri="{BB962C8B-B14F-4D97-AF65-F5344CB8AC3E}">
+        <p14:creationId xmlns:p14="http://schemas.microsoft.com/office/powerpoint/2010/main" val="2310773345"/>
+      </p:ext>
+    </p:extLst>
+  </p:cSld>
+  <p:clrMapOvr>
+    <a:masterClrMapping/>
+  </p:clrMapOvr>
+</p:sld>
+</file>
+
+<file path=ppt/slides/slide5.xml><?xml version="1.0" encoding="utf-8"?>
 <p:sld xmlns:a="http://schemas.openxmlformats.org/drawingml/2006/main" xmlns:r="http://schemas.openxmlformats.org/officeDocument/2006/relationships" xmlns:p="http://schemas.openxmlformats.org/presentationml/2006/main">
   <p:cSld>
     <p:spTree>
@@ -7360,7 +9472,7 @@
             </a:pPr>
             <a:r>
               <a:rPr lang="en" dirty="0"/>
-              <a:t>Project Report - 7 points </a:t>
+              <a:t>Project Report - 10 points </a:t>
             </a:r>
             <a:endParaRPr sz="3022" dirty="0"/>
           </a:p>
@@ -7418,7 +9530,7 @@
                 <a:cs typeface="Roboto"/>
                 <a:sym typeface="Roboto"/>
               </a:rPr>
-              <a:t>Each team member should submit a project report of around 1,200-1800 words of explanatory text, minimal code, not including figures and tables unless necessary, in pdf format. </a:t>
+              <a:t>Student should submit a project report (in .pdf) of around 1,200-1800 words of explanatory text, minimal code, not including figures and tables unless necessary, in pdf format. </a:t>
             </a:r>
             <a:r>
               <a:rPr lang="en-US" sz="1650" dirty="0">
@@ -7448,10 +9560,25 @@
                 <a:cs typeface="Roboto"/>
                 <a:sym typeface="Roboto"/>
               </a:rPr>
-              <a:t> your project report and python code on </a:t>
+              <a:t> your project report and </a:t>
             </a:r>
             <a:r>
-              <a:rPr lang="en" sz="1650" dirty="0" err="1">
+              <a:rPr lang="en" sz="1650" b="1" u="sng" dirty="0">
+                <a:solidFill>
+                  <a:schemeClr val="dk1"/>
+                </a:solidFill>
+                <a:highlight>
+                  <a:srgbClr val="FFFFFF"/>
+                </a:highlight>
+                <a:latin typeface="Roboto"/>
+                <a:ea typeface="Roboto"/>
+                <a:cs typeface="Roboto"/>
+                <a:sym typeface="Roboto"/>
+              </a:rPr>
+              <a:t>python code, and presentation on </a:t>
+            </a:r>
+            <a:r>
+              <a:rPr lang="en" sz="1650" b="1" u="sng" dirty="0" err="1">
                 <a:solidFill>
                   <a:schemeClr val="dk1"/>
                 </a:solidFill>
@@ -7478,7 +9605,38 @@
                 <a:cs typeface="Roboto"/>
                 <a:sym typeface="Roboto"/>
               </a:rPr>
-              <a:t>.</a:t>
+              <a:t>. </a:t>
+            </a:r>
+          </a:p>
+          <a:p>
+            <a:pPr marL="457200" lvl="0" indent="-333375" algn="l" rtl="0">
+              <a:spcBef>
+                <a:spcPts val="0"/>
+              </a:spcBef>
+              <a:spcAft>
+                <a:spcPts val="0"/>
+              </a:spcAft>
+              <a:buClr>
+                <a:schemeClr val="dk1"/>
+              </a:buClr>
+              <a:buSzPts val="1650"/>
+              <a:buFont typeface="Roboto"/>
+              <a:buChar char="-"/>
+            </a:pPr>
+            <a:r>
+              <a:rPr lang="en" sz="1650" dirty="0">
+                <a:solidFill>
+                  <a:schemeClr val="dk1"/>
+                </a:solidFill>
+                <a:highlight>
+                  <a:srgbClr val="FFFFFF"/>
+                </a:highlight>
+                <a:latin typeface="Roboto"/>
+                <a:ea typeface="Roboto"/>
+                <a:cs typeface="Roboto"/>
+                <a:sym typeface="Roboto"/>
+              </a:rPr>
+              <a:t>Font size 11 points (any font). Single Line.</a:t>
             </a:r>
           </a:p>
           <a:p>
@@ -7503,7 +9661,7 @@
                 <a:cs typeface="Roboto"/>
                 <a:sym typeface="Roboto"/>
               </a:rPr>
-              <a:t>The following headings should be used by the entire team (4 points)</a:t>
+              <a:t>The following headings should be used (2 points each):</a:t>
             </a:r>
           </a:p>
           <a:p>
@@ -7528,7 +9686,7 @@
                 <a:cs typeface="Roboto"/>
                 <a:sym typeface="Roboto"/>
               </a:rPr>
-              <a:t>Name of project, team members, emails, RIT ids.</a:t>
+              <a:t>Name of project, student name, RIT email ID</a:t>
             </a:r>
           </a:p>
           <a:p>
@@ -7578,20 +9736,10 @@
                 <a:cs typeface="Roboto"/>
                 <a:sym typeface="Roboto"/>
               </a:rPr>
-              <a:t>Data research: search for relevant data to contribute to the question;</a:t>
+              <a:t>Models shortlisted and data chosen. </a:t>
             </a:r>
-          </a:p>
-          <a:p>
-            <a:pPr marL="914400" lvl="0" indent="-333375">
-              <a:buClr>
-                <a:schemeClr val="dk1"/>
-              </a:buClr>
-              <a:buSzPts val="1650"/>
-              <a:buFont typeface="Roboto"/>
-              <a:buAutoNum type="arabicPeriod"/>
-            </a:pPr>
             <a:r>
-              <a:rPr lang="en-US" sz="1650" dirty="0">
+              <a:rPr lang="en-US" sz="1650" i="1" dirty="0">
                 <a:solidFill>
                   <a:schemeClr val="dk1"/>
                 </a:solidFill>
@@ -7603,7 +9751,7 @@
                 <a:cs typeface="Roboto"/>
                 <a:sym typeface="Roboto"/>
               </a:rPr>
-              <a:t>Literature review – models, problem choice, data. Not a very big section.</a:t>
+              <a:t>Not a very big section.</a:t>
             </a:r>
           </a:p>
           <a:p>
@@ -7653,58 +9801,29 @@
                 <a:cs typeface="Roboto"/>
                 <a:sym typeface="Roboto"/>
               </a:rPr>
-              <a:t>Analysis code;</a:t>
+              <a:t>Analysis code – only main snippets from code.</a:t>
             </a:r>
           </a:p>
           <a:p>
-            <a:pPr marL="914400" lvl="0" indent="-333375">
+            <a:pPr marL="581025" lvl="0" indent="0">
               <a:buClr>
                 <a:schemeClr val="dk1"/>
               </a:buClr>
               <a:buSzPts val="1650"/>
-              <a:buFont typeface="Roboto"/>
-              <a:buAutoNum type="arabicPeriod"/>
+              <a:buNone/>
             </a:pPr>
-            <a:r>
-              <a:rPr lang="en-US" sz="1650" b="1" dirty="0">
-                <a:solidFill>
-                  <a:schemeClr val="dk1"/>
-                </a:solidFill>
-                <a:highlight>
-                  <a:srgbClr val="FFFFFF"/>
-                </a:highlight>
-                <a:latin typeface="Roboto"/>
-                <a:ea typeface="Roboto"/>
-                <a:cs typeface="Roboto"/>
-                <a:sym typeface="Roboto"/>
-              </a:rPr>
-              <a:t>Work planning and organization of each team member (2 lines only)</a:t>
-            </a:r>
-          </a:p>
-          <a:p>
-            <a:pPr indent="-333375">
-              <a:buClr>
+            <a:endParaRPr lang="en-US" sz="1650" dirty="0">
+              <a:solidFill>
                 <a:schemeClr val="dk1"/>
-              </a:buClr>
-              <a:buSzPts val="1650"/>
-              <a:buFont typeface="Roboto"/>
-              <a:buChar char="-"/>
-            </a:pPr>
-            <a:r>
-              <a:rPr lang="en-US" sz="1650" b="1" dirty="0">
-                <a:solidFill>
-                  <a:schemeClr val="dk1"/>
-                </a:solidFill>
-                <a:highlight>
-                  <a:srgbClr val="FFFFFF"/>
-                </a:highlight>
-                <a:latin typeface="Roboto"/>
-                <a:ea typeface="Roboto"/>
-                <a:cs typeface="Roboto"/>
-                <a:sym typeface="Roboto"/>
-              </a:rPr>
-              <a:t>500 words of individual contribution (3 points)</a:t>
-            </a:r>
+              </a:solidFill>
+              <a:highlight>
+                <a:srgbClr val="FFFFFF"/>
+              </a:highlight>
+              <a:latin typeface="Roboto"/>
+              <a:ea typeface="Roboto"/>
+              <a:cs typeface="Roboto"/>
+              <a:sym typeface="Roboto"/>
+            </a:endParaRPr>
           </a:p>
         </p:txBody>
       </p:sp>
@@ -7716,7 +9835,7 @@
 </p:sld>
 </file>
 
-<file path=ppt/slides/slide5.xml><?xml version="1.0" encoding="utf-8"?>
+<file path=ppt/slides/slide6.xml><?xml version="1.0" encoding="utf-8"?>
 <p:sld xmlns:a="http://schemas.openxmlformats.org/drawingml/2006/main" xmlns:r="http://schemas.openxmlformats.org/officeDocument/2006/relationships" xmlns:p="http://schemas.openxmlformats.org/presentationml/2006/main">
   <p:cSld>
     <p:spTree>
@@ -7769,7 +9888,7 @@
             </a:pPr>
             <a:r>
               <a:rPr lang="en" b="1" dirty="0"/>
-              <a:t>Project Presentation - 8 points</a:t>
+              <a:t>Project Presentation - 20 points</a:t>
             </a:r>
             <a:endParaRPr b="1" dirty="0"/>
           </a:p>
@@ -7826,7 +9945,7 @@
                 <a:cs typeface="Roboto"/>
                 <a:sym typeface="Roboto"/>
               </a:rPr>
-              <a:t>Every presentation is 10 minutes long, followed by 5 minutes for Q&amp;A.</a:t>
+              <a:t>Every presentation is 7 minutes long, followed by 2 minutes for Q&amp;A.</a:t>
             </a:r>
             <a:endParaRPr sz="1602" dirty="0">
               <a:solidFill>
@@ -7979,7 +10098,7 @@
                 <a:cs typeface="Roboto"/>
                 <a:sym typeface="Roboto"/>
               </a:rPr>
-              <a:t>Describe your main findings.</a:t>
+              <a:t>Describe your main findings – model and analysis.</a:t>
             </a:r>
             <a:endParaRPr sz="1602" dirty="0">
               <a:solidFill>
@@ -8025,7 +10144,7 @@
                 <a:cs typeface="Roboto"/>
                 <a:sym typeface="Roboto"/>
               </a:rPr>
-              <a:t>Draw conclusions with lots of explanations, citing evidence from your data and any relevant literature.</a:t>
+              <a:t>Draw conclusions with explanations, citing evidence from your model performance.</a:t>
             </a:r>
             <a:endParaRPr sz="1602" dirty="0">
               <a:solidFill>
@@ -8038,153 +10157,6 @@
               <a:ea typeface="Roboto"/>
               <a:cs typeface="Roboto"/>
               <a:sym typeface="Roboto"/>
-            </a:endParaRPr>
-          </a:p>
-          <a:p>
-            <a:pPr marL="0" lvl="0" indent="0" algn="l" rtl="0">
-              <a:lnSpc>
-                <a:spcPct val="95000"/>
-              </a:lnSpc>
-              <a:spcBef>
-                <a:spcPts val="2500"/>
-              </a:spcBef>
-              <a:spcAft>
-                <a:spcPts val="0"/>
-              </a:spcAft>
-              <a:buSzPts val="935"/>
-              <a:buNone/>
-            </a:pPr>
-            <a:r>
-              <a:rPr lang="en" sz="1602" dirty="0">
-                <a:solidFill>
-                  <a:schemeClr val="dk1"/>
-                </a:solidFill>
-                <a:highlight>
-                  <a:srgbClr val="FFFFFF"/>
-                </a:highlight>
-                <a:latin typeface="Roboto"/>
-                <a:ea typeface="Roboto"/>
-                <a:cs typeface="Roboto"/>
-                <a:sym typeface="Roboto"/>
-              </a:rPr>
-              <a:t>Every group member will present a part of the presentation, preferably what they worked on, and questions will be asked at the end of the presentation.</a:t>
-            </a:r>
-          </a:p>
-        </p:txBody>
-      </p:sp>
-    </p:spTree>
-  </p:cSld>
-  <p:clrMapOvr>
-    <a:masterClrMapping/>
-  </p:clrMapOvr>
-</p:sld>
-</file>
-
-<file path=ppt/slides/slide6.xml><?xml version="1.0" encoding="utf-8"?>
-<p:sld xmlns:a="http://schemas.openxmlformats.org/drawingml/2006/main" xmlns:r="http://schemas.openxmlformats.org/officeDocument/2006/relationships" xmlns:p="http://schemas.openxmlformats.org/presentationml/2006/main">
-  <p:cSld>
-    <p:spTree>
-      <p:nvGrpSpPr>
-        <p:cNvPr id="1" name="Shape 70"/>
-        <p:cNvGrpSpPr/>
-        <p:nvPr/>
-      </p:nvGrpSpPr>
-      <p:grpSpPr>
-        <a:xfrm>
-          <a:off x="0" y="0"/>
-          <a:ext cx="0" cy="0"/>
-          <a:chOff x="0" y="0"/>
-          <a:chExt cx="0" cy="0"/>
-        </a:xfrm>
-      </p:grpSpPr>
-      <p:sp>
-        <p:nvSpPr>
-          <p:cNvPr id="71" name="Google Shape;71;p16"/>
-          <p:cNvSpPr txBox="1">
-            <a:spLocks noGrp="1"/>
-          </p:cNvSpPr>
-          <p:nvPr>
-            <p:ph type="title"/>
-          </p:nvPr>
-        </p:nvSpPr>
-        <p:spPr>
-          <a:xfrm>
-            <a:off x="311700" y="445025"/>
-            <a:ext cx="8520600" cy="572700"/>
-          </a:xfrm>
-          <a:prstGeom prst="rect">
-            <a:avLst/>
-          </a:prstGeom>
-        </p:spPr>
-        <p:txBody>
-          <a:bodyPr spcFirstLastPara="1" wrap="square" lIns="91425" tIns="91425" rIns="91425" bIns="91425" anchor="t" anchorCtr="0">
-            <a:normAutofit fontScale="90000"/>
-          </a:bodyPr>
-          <a:lstStyle/>
-          <a:p>
-            <a:pPr marL="0" lvl="0" indent="0" algn="l" rtl="0">
-              <a:spcBef>
-                <a:spcPts val="0"/>
-              </a:spcBef>
-              <a:spcAft>
-                <a:spcPts val="0"/>
-              </a:spcAft>
-              <a:buNone/>
-            </a:pPr>
-            <a:r>
-              <a:rPr lang="en"/>
-              <a:t>Team Member responsibilities (All team members)</a:t>
-            </a:r>
-            <a:endParaRPr/>
-          </a:p>
-        </p:txBody>
-      </p:sp>
-      <p:sp>
-        <p:nvSpPr>
-          <p:cNvPr id="72" name="Google Shape;72;p16"/>
-          <p:cNvSpPr txBox="1">
-            <a:spLocks noGrp="1"/>
-          </p:cNvSpPr>
-          <p:nvPr>
-            <p:ph type="body" idx="1"/>
-          </p:nvPr>
-        </p:nvSpPr>
-        <p:spPr>
-          <a:xfrm>
-            <a:off x="311700" y="1152475"/>
-            <a:ext cx="8520600" cy="3416400"/>
-          </a:xfrm>
-          <a:prstGeom prst="rect">
-            <a:avLst/>
-          </a:prstGeom>
-        </p:spPr>
-        <p:txBody>
-          <a:bodyPr spcFirstLastPara="1" wrap="square" lIns="91425" tIns="91425" rIns="91425" bIns="91425" anchor="t" anchorCtr="0">
-            <a:normAutofit/>
-          </a:bodyPr>
-          <a:lstStyle/>
-          <a:p>
-            <a:pPr marL="0" lvl="0" indent="0" algn="l" rtl="0">
-              <a:spcBef>
-                <a:spcPts val="0"/>
-              </a:spcBef>
-              <a:spcAft>
-                <a:spcPts val="1200"/>
-              </a:spcAft>
-              <a:buNone/>
-            </a:pPr>
-            <a:r>
-              <a:rPr lang="en-US" dirty="0">
-                <a:solidFill>
-                  <a:schemeClr val="tx1"/>
-                </a:solidFill>
-              </a:rPr>
-              <a:t>For the benefit of gaining deserving points, every team member should get tasks that is close to equal. If you feel you’re unable to contribute equally, discuss that with other members. You may have to spend extra time in your task. </a:t>
-            </a:r>
-            <a:endParaRPr dirty="0">
-              <a:solidFill>
-                <a:schemeClr val="tx1"/>
-              </a:solidFill>
             </a:endParaRPr>
           </a:p>
         </p:txBody>

</xml_diff>